<commit_message>
Small updates to Day 5 & 6 PPTs, updated Day 6 Code Examples and Removed Day 7 DOM Manipulation Bonus Content
</commit_message>
<xml_diff>
--- a/revised-ppts/Day 5 PPT.pptx
+++ b/revised-ppts/Day 5 PPT.pptx
@@ -2,39 +2,39 @@
 <file path=ppt/presentation.xml><?xml version="1.0" encoding="utf-8"?>
 <p:presentation xmlns:a="http://schemas.openxmlformats.org/drawingml/2006/main" xmlns:r="http://schemas.openxmlformats.org/officeDocument/2006/relationships" xmlns:p="http://schemas.openxmlformats.org/presentationml/2006/main" firstSlideNum="0" saveSubsetFonts="1">
   <p:sldMasterIdLst>
-    <p:sldMasterId id="2147483690" r:id="rId1"/>
+    <p:sldMasterId id="2147483690" r:id="rId4"/>
   </p:sldMasterIdLst>
   <p:notesMasterIdLst>
-    <p:notesMasterId r:id="rId26"/>
+    <p:notesMasterId r:id="rId29"/>
   </p:notesMasterIdLst>
   <p:handoutMasterIdLst>
-    <p:handoutMasterId r:id="rId27"/>
+    <p:handoutMasterId r:id="rId30"/>
   </p:handoutMasterIdLst>
   <p:sldIdLst>
-    <p:sldId id="256" r:id="rId2"/>
-    <p:sldId id="303" r:id="rId3"/>
-    <p:sldId id="305" r:id="rId4"/>
-    <p:sldId id="257" r:id="rId5"/>
-    <p:sldId id="306" r:id="rId6"/>
-    <p:sldId id="262" r:id="rId7"/>
-    <p:sldId id="312" r:id="rId8"/>
-    <p:sldId id="310" r:id="rId9"/>
-    <p:sldId id="313" r:id="rId10"/>
-    <p:sldId id="311" r:id="rId11"/>
-    <p:sldId id="260" r:id="rId12"/>
-    <p:sldId id="261" r:id="rId13"/>
-    <p:sldId id="307" r:id="rId14"/>
-    <p:sldId id="300" r:id="rId15"/>
-    <p:sldId id="308" r:id="rId16"/>
-    <p:sldId id="279" r:id="rId17"/>
-    <p:sldId id="299" r:id="rId18"/>
-    <p:sldId id="315" r:id="rId19"/>
-    <p:sldId id="263" r:id="rId20"/>
-    <p:sldId id="264" r:id="rId21"/>
-    <p:sldId id="309" r:id="rId22"/>
-    <p:sldId id="316" r:id="rId23"/>
-    <p:sldId id="317" r:id="rId24"/>
-    <p:sldId id="258" r:id="rId25"/>
+    <p:sldId id="256" r:id="rId5"/>
+    <p:sldId id="303" r:id="rId6"/>
+    <p:sldId id="305" r:id="rId7"/>
+    <p:sldId id="257" r:id="rId8"/>
+    <p:sldId id="307" r:id="rId9"/>
+    <p:sldId id="300" r:id="rId10"/>
+    <p:sldId id="306" r:id="rId11"/>
+    <p:sldId id="262" r:id="rId12"/>
+    <p:sldId id="312" r:id="rId13"/>
+    <p:sldId id="310" r:id="rId14"/>
+    <p:sldId id="313" r:id="rId15"/>
+    <p:sldId id="311" r:id="rId16"/>
+    <p:sldId id="260" r:id="rId17"/>
+    <p:sldId id="261" r:id="rId18"/>
+    <p:sldId id="308" r:id="rId19"/>
+    <p:sldId id="279" r:id="rId20"/>
+    <p:sldId id="299" r:id="rId21"/>
+    <p:sldId id="315" r:id="rId22"/>
+    <p:sldId id="263" r:id="rId23"/>
+    <p:sldId id="264" r:id="rId24"/>
+    <p:sldId id="309" r:id="rId25"/>
+    <p:sldId id="316" r:id="rId26"/>
+    <p:sldId id="317" r:id="rId27"/>
+    <p:sldId id="258" r:id="rId28"/>
   </p:sldIdLst>
   <p:sldSz cx="9144000" cy="6858000" type="screen4x3"/>
   <p:notesSz cx="7010400" cy="9296400"/>
@@ -256,6 +256,67 @@
 <file path=ppt/changesInfos/changesInfo1.xml><?xml version="1.0" encoding="utf-8"?>
 <pc:chgInfo xmlns:a="http://schemas.openxmlformats.org/drawingml/2006/main" xmlns:r="http://schemas.openxmlformats.org/officeDocument/2006/relationships" xmlns:ac="http://schemas.microsoft.com/office/drawing/2013/main/command" xmlns:pc="http://schemas.microsoft.com/office/powerpoint/2013/main/command">
   <pc:docChgLst>
+    <pc:chgData name="Cynthia Enciso" userId="7915927f-c5cf-4e1f-876d-e79882ad52fa" providerId="ADAL" clId="{DE83FFC9-65A1-4D5A-AC16-1F63326FD5B3}"/>
+    <pc:docChg chg="custSel modSld sldOrd">
+      <pc:chgData name="Cynthia Enciso" userId="7915927f-c5cf-4e1f-876d-e79882ad52fa" providerId="ADAL" clId="{DE83FFC9-65A1-4D5A-AC16-1F63326FD5B3}" dt="2021-04-26T21:18:34.525" v="228" actId="20577"/>
+      <pc:docMkLst>
+        <pc:docMk/>
+      </pc:docMkLst>
+      <pc:sldChg chg="modSp mod">
+        <pc:chgData name="Cynthia Enciso" userId="7915927f-c5cf-4e1f-876d-e79882ad52fa" providerId="ADAL" clId="{DE83FFC9-65A1-4D5A-AC16-1F63326FD5B3}" dt="2021-04-26T21:18:34.525" v="228" actId="20577"/>
+        <pc:sldMkLst>
+          <pc:docMk/>
+          <pc:sldMk cId="2239329120" sldId="260"/>
+        </pc:sldMkLst>
+        <pc:spChg chg="mod">
+          <ac:chgData name="Cynthia Enciso" userId="7915927f-c5cf-4e1f-876d-e79882ad52fa" providerId="ADAL" clId="{DE83FFC9-65A1-4D5A-AC16-1F63326FD5B3}" dt="2021-04-26T21:18:34.525" v="228" actId="20577"/>
+          <ac:spMkLst>
+            <pc:docMk/>
+            <pc:sldMk cId="2239329120" sldId="260"/>
+            <ac:spMk id="3" creationId="{3F42FAFD-56E3-49A6-87C2-06ABA142F389}"/>
+          </ac:spMkLst>
+        </pc:spChg>
+      </pc:sldChg>
+      <pc:sldChg chg="modSp mod ord">
+        <pc:chgData name="Cynthia Enciso" userId="7915927f-c5cf-4e1f-876d-e79882ad52fa" providerId="ADAL" clId="{DE83FFC9-65A1-4D5A-AC16-1F63326FD5B3}" dt="2021-04-26T21:11:19.439" v="122" actId="20577"/>
+        <pc:sldMkLst>
+          <pc:docMk/>
+          <pc:sldMk cId="3605997529" sldId="262"/>
+        </pc:sldMkLst>
+        <pc:spChg chg="mod">
+          <ac:chgData name="Cynthia Enciso" userId="7915927f-c5cf-4e1f-876d-e79882ad52fa" providerId="ADAL" clId="{DE83FFC9-65A1-4D5A-AC16-1F63326FD5B3}" dt="2021-04-26T21:11:19.439" v="122" actId="20577"/>
+          <ac:spMkLst>
+            <pc:docMk/>
+            <pc:sldMk cId="3605997529" sldId="262"/>
+            <ac:spMk id="3" creationId="{6FFA52D6-4156-44B1-A892-2180884273BC}"/>
+          </ac:spMkLst>
+        </pc:spChg>
+      </pc:sldChg>
+      <pc:sldChg chg="modSp mod ord">
+        <pc:chgData name="Cynthia Enciso" userId="7915927f-c5cf-4e1f-876d-e79882ad52fa" providerId="ADAL" clId="{DE83FFC9-65A1-4D5A-AC16-1F63326FD5B3}" dt="2021-04-26T21:16:35.510" v="186" actId="27636"/>
+        <pc:sldMkLst>
+          <pc:docMk/>
+          <pc:sldMk cId="1933041044" sldId="265"/>
+        </pc:sldMkLst>
+        <pc:spChg chg="mod">
+          <ac:chgData name="Cynthia Enciso" userId="7915927f-c5cf-4e1f-876d-e79882ad52fa" providerId="ADAL" clId="{DE83FFC9-65A1-4D5A-AC16-1F63326FD5B3}" dt="2021-04-26T21:16:35.510" v="186" actId="27636"/>
+          <ac:spMkLst>
+            <pc:docMk/>
+            <pc:sldMk cId="1933041044" sldId="265"/>
+            <ac:spMk id="3" creationId="{6FFA52D6-4156-44B1-A892-2180884273BC}"/>
+          </ac:spMkLst>
+        </pc:spChg>
+      </pc:sldChg>
+      <pc:sldChg chg="ord">
+        <pc:chgData name="Cynthia Enciso" userId="7915927f-c5cf-4e1f-876d-e79882ad52fa" providerId="ADAL" clId="{DE83FFC9-65A1-4D5A-AC16-1F63326FD5B3}" dt="2021-04-01T20:18:57.604" v="1"/>
+        <pc:sldMkLst>
+          <pc:docMk/>
+          <pc:sldMk cId="1944234847" sldId="301"/>
+        </pc:sldMkLst>
+      </pc:sldChg>
+    </pc:docChg>
+  </pc:docChgLst>
+  <pc:docChgLst>
     <pc:chgData name="Cynthia Enciso" userId="7915927f-c5cf-4e1f-876d-e79882ad52fa" providerId="ADAL" clId="{706900BE-6B77-4F82-AF55-BBF93D990BBE}"/>
     <pc:docChg chg="undo custSel addSld modSld">
       <pc:chgData name="Cynthia Enciso" userId="7915927f-c5cf-4e1f-876d-e79882ad52fa" providerId="ADAL" clId="{706900BE-6B77-4F82-AF55-BBF93D990BBE}" dt="2021-05-28T18:59:50.946" v="463" actId="20577"/>
@@ -357,52 +418,6 @@
             <pc:docMk/>
             <pc:sldMk cId="1548078855" sldId="302"/>
             <ac:spMk id="3" creationId="{5108C239-7E4E-4CFB-A531-916B9A74A353}"/>
-          </ac:spMkLst>
-        </pc:spChg>
-      </pc:sldChg>
-    </pc:docChg>
-  </pc:docChgLst>
-  <pc:docChgLst>
-    <pc:chgData name="Cynthia Enciso" userId="7915927f-c5cf-4e1f-876d-e79882ad52fa" providerId="ADAL" clId="{73B21D03-29C7-4986-B0BA-4FA7C84A6508}"/>
-    <pc:docChg chg="delSld modSld">
-      <pc:chgData name="Cynthia Enciso" userId="7915927f-c5cf-4e1f-876d-e79882ad52fa" providerId="ADAL" clId="{73B21D03-29C7-4986-B0BA-4FA7C84A6508}" dt="2021-12-03T17:17:17.966" v="19" actId="20577"/>
-      <pc:docMkLst>
-        <pc:docMk/>
-      </pc:docMkLst>
-      <pc:sldChg chg="del">
-        <pc:chgData name="Cynthia Enciso" userId="7915927f-c5cf-4e1f-876d-e79882ad52fa" providerId="ADAL" clId="{73B21D03-29C7-4986-B0BA-4FA7C84A6508}" dt="2021-11-19T18:17:37.164" v="0" actId="47"/>
-        <pc:sldMkLst>
-          <pc:docMk/>
-          <pc:sldMk cId="1548078855" sldId="302"/>
-        </pc:sldMkLst>
-      </pc:sldChg>
-      <pc:sldChg chg="modSp mod">
-        <pc:chgData name="Cynthia Enciso" userId="7915927f-c5cf-4e1f-876d-e79882ad52fa" providerId="ADAL" clId="{73B21D03-29C7-4986-B0BA-4FA7C84A6508}" dt="2021-12-03T17:17:17.966" v="19" actId="20577"/>
-        <pc:sldMkLst>
-          <pc:docMk/>
-          <pc:sldMk cId="2441782704" sldId="310"/>
-        </pc:sldMkLst>
-        <pc:spChg chg="mod">
-          <ac:chgData name="Cynthia Enciso" userId="7915927f-c5cf-4e1f-876d-e79882ad52fa" providerId="ADAL" clId="{73B21D03-29C7-4986-B0BA-4FA7C84A6508}" dt="2021-12-03T17:17:17.966" v="19" actId="20577"/>
-          <ac:spMkLst>
-            <pc:docMk/>
-            <pc:sldMk cId="2441782704" sldId="310"/>
-            <ac:spMk id="3" creationId="{3806DEF6-3785-4BAC-9C3B-BDFAE1DA8C03}"/>
-          </ac:spMkLst>
-        </pc:spChg>
-      </pc:sldChg>
-      <pc:sldChg chg="modSp mod">
-        <pc:chgData name="Cynthia Enciso" userId="7915927f-c5cf-4e1f-876d-e79882ad52fa" providerId="ADAL" clId="{73B21D03-29C7-4986-B0BA-4FA7C84A6508}" dt="2021-11-22T23:16:57.006" v="2" actId="20577"/>
-        <pc:sldMkLst>
-          <pc:docMk/>
-          <pc:sldMk cId="710416380" sldId="315"/>
-        </pc:sldMkLst>
-        <pc:spChg chg="mod">
-          <ac:chgData name="Cynthia Enciso" userId="7915927f-c5cf-4e1f-876d-e79882ad52fa" providerId="ADAL" clId="{73B21D03-29C7-4986-B0BA-4FA7C84A6508}" dt="2021-11-22T23:16:57.006" v="2" actId="20577"/>
-          <ac:spMkLst>
-            <pc:docMk/>
-            <pc:sldMk cId="710416380" sldId="315"/>
-            <ac:spMk id="14" creationId="{391BB88A-0678-4D74-B1D4-4729A8328E90}"/>
           </ac:spMkLst>
         </pc:spChg>
       </pc:sldChg>
@@ -1636,137 +1651,46 @@
     </pc:docChg>
   </pc:docChgLst>
   <pc:docChgLst>
-    <pc:chgData name="Cynthia Enciso" userId="7915927f-c5cf-4e1f-876d-e79882ad52fa" providerId="ADAL" clId="{597ECC70-4FC7-4D93-8FC5-722A12D65026}"/>
-    <pc:docChg chg="undo custSel addSld delSld modSld sldOrd">
-      <pc:chgData name="Cynthia Enciso" userId="7915927f-c5cf-4e1f-876d-e79882ad52fa" providerId="ADAL" clId="{597ECC70-4FC7-4D93-8FC5-722A12D65026}" dt="2022-03-21T22:05:31.488" v="456"/>
+    <pc:chgData name="Cynthia Enciso" userId="7915927f-c5cf-4e1f-876d-e79882ad52fa" providerId="ADAL" clId="{73B21D03-29C7-4986-B0BA-4FA7C84A6508}"/>
+    <pc:docChg chg="delSld modSld">
+      <pc:chgData name="Cynthia Enciso" userId="7915927f-c5cf-4e1f-876d-e79882ad52fa" providerId="ADAL" clId="{73B21D03-29C7-4986-B0BA-4FA7C84A6508}" dt="2021-12-03T17:17:17.966" v="19" actId="20577"/>
       <pc:docMkLst>
         <pc:docMk/>
       </pc:docMkLst>
-      <pc:sldChg chg="modSp mod">
-        <pc:chgData name="Cynthia Enciso" userId="7915927f-c5cf-4e1f-876d-e79882ad52fa" providerId="ADAL" clId="{597ECC70-4FC7-4D93-8FC5-722A12D65026}" dt="2022-02-21T21:35:59.267" v="266" actId="20577"/>
+      <pc:sldChg chg="del">
+        <pc:chgData name="Cynthia Enciso" userId="7915927f-c5cf-4e1f-876d-e79882ad52fa" providerId="ADAL" clId="{73B21D03-29C7-4986-B0BA-4FA7C84A6508}" dt="2021-11-19T18:17:37.164" v="0" actId="47"/>
         <pc:sldMkLst>
           <pc:docMk/>
-          <pc:sldMk cId="384837883" sldId="261"/>
+          <pc:sldMk cId="1548078855" sldId="302"/>
+        </pc:sldMkLst>
+      </pc:sldChg>
+      <pc:sldChg chg="modSp mod">
+        <pc:chgData name="Cynthia Enciso" userId="7915927f-c5cf-4e1f-876d-e79882ad52fa" providerId="ADAL" clId="{73B21D03-29C7-4986-B0BA-4FA7C84A6508}" dt="2021-12-03T17:17:17.966" v="19" actId="20577"/>
+        <pc:sldMkLst>
+          <pc:docMk/>
+          <pc:sldMk cId="2441782704" sldId="310"/>
         </pc:sldMkLst>
         <pc:spChg chg="mod">
-          <ac:chgData name="Cynthia Enciso" userId="7915927f-c5cf-4e1f-876d-e79882ad52fa" providerId="ADAL" clId="{597ECC70-4FC7-4D93-8FC5-722A12D65026}" dt="2022-02-21T21:35:59.267" v="266" actId="20577"/>
+          <ac:chgData name="Cynthia Enciso" userId="7915927f-c5cf-4e1f-876d-e79882ad52fa" providerId="ADAL" clId="{73B21D03-29C7-4986-B0BA-4FA7C84A6508}" dt="2021-12-03T17:17:17.966" v="19" actId="20577"/>
           <ac:spMkLst>
             <pc:docMk/>
-            <pc:sldMk cId="384837883" sldId="261"/>
-            <ac:spMk id="3" creationId="{58E352E8-4AD7-4404-8075-D6F4C5358A96}"/>
+            <pc:sldMk cId="2441782704" sldId="310"/>
+            <ac:spMk id="3" creationId="{3806DEF6-3785-4BAC-9C3B-BDFAE1DA8C03}"/>
           </ac:spMkLst>
         </pc:spChg>
       </pc:sldChg>
       <pc:sldChg chg="modSp mod">
-        <pc:chgData name="Cynthia Enciso" userId="7915927f-c5cf-4e1f-876d-e79882ad52fa" providerId="ADAL" clId="{597ECC70-4FC7-4D93-8FC5-722A12D65026}" dt="2022-03-02T18:06:52.949" v="430" actId="20577"/>
-        <pc:sldMkLst>
-          <pc:docMk/>
-          <pc:sldMk cId="3605997529" sldId="262"/>
-        </pc:sldMkLst>
-        <pc:spChg chg="mod">
-          <ac:chgData name="Cynthia Enciso" userId="7915927f-c5cf-4e1f-876d-e79882ad52fa" providerId="ADAL" clId="{597ECC70-4FC7-4D93-8FC5-722A12D65026}" dt="2022-03-02T18:06:52.949" v="430" actId="20577"/>
-          <ac:spMkLst>
-            <pc:docMk/>
-            <pc:sldMk cId="3605997529" sldId="262"/>
-            <ac:spMk id="3" creationId="{6FFA52D6-4156-44B1-A892-2180884273BC}"/>
-          </ac:spMkLst>
-        </pc:spChg>
-      </pc:sldChg>
-      <pc:sldChg chg="modSp mod">
-        <pc:chgData name="Cynthia Enciso" userId="7915927f-c5cf-4e1f-876d-e79882ad52fa" providerId="ADAL" clId="{597ECC70-4FC7-4D93-8FC5-722A12D65026}" dt="2022-03-21T21:12:51.447" v="442" actId="20577"/>
-        <pc:sldMkLst>
-          <pc:docMk/>
-          <pc:sldMk cId="608514704" sldId="312"/>
-        </pc:sldMkLst>
-        <pc:spChg chg="mod">
-          <ac:chgData name="Cynthia Enciso" userId="7915927f-c5cf-4e1f-876d-e79882ad52fa" providerId="ADAL" clId="{597ECC70-4FC7-4D93-8FC5-722A12D65026}" dt="2022-03-21T21:12:51.447" v="442" actId="20577"/>
-          <ac:spMkLst>
-            <pc:docMk/>
-            <pc:sldMk cId="608514704" sldId="312"/>
-            <ac:spMk id="7" creationId="{16DB0091-3EA4-4B1A-8A2D-5754F6476AD9}"/>
-          </ac:spMkLst>
-        </pc:spChg>
-      </pc:sldChg>
-      <pc:sldChg chg="modSp mod">
-        <pc:chgData name="Cynthia Enciso" userId="7915927f-c5cf-4e1f-876d-e79882ad52fa" providerId="ADAL" clId="{597ECC70-4FC7-4D93-8FC5-722A12D65026}" dt="2022-03-21T21:17:21.831" v="450" actId="20577"/>
-        <pc:sldMkLst>
-          <pc:docMk/>
-          <pc:sldMk cId="455569934" sldId="313"/>
-        </pc:sldMkLst>
-        <pc:spChg chg="mod">
-          <ac:chgData name="Cynthia Enciso" userId="7915927f-c5cf-4e1f-876d-e79882ad52fa" providerId="ADAL" clId="{597ECC70-4FC7-4D93-8FC5-722A12D65026}" dt="2022-03-21T21:17:21.831" v="450" actId="20577"/>
-          <ac:spMkLst>
-            <pc:docMk/>
-            <pc:sldMk cId="455569934" sldId="313"/>
-            <ac:spMk id="10" creationId="{219770C9-6574-43D3-95DD-A2A10A98B2E2}"/>
-          </ac:spMkLst>
-        </pc:spChg>
-      </pc:sldChg>
-      <pc:sldChg chg="modSp mod">
-        <pc:chgData name="Cynthia Enciso" userId="7915927f-c5cf-4e1f-876d-e79882ad52fa" providerId="ADAL" clId="{597ECC70-4FC7-4D93-8FC5-722A12D65026}" dt="2022-03-21T21:47:05.753" v="452" actId="21"/>
+        <pc:chgData name="Cynthia Enciso" userId="7915927f-c5cf-4e1f-876d-e79882ad52fa" providerId="ADAL" clId="{73B21D03-29C7-4986-B0BA-4FA7C84A6508}" dt="2021-11-22T23:16:57.006" v="2" actId="20577"/>
         <pc:sldMkLst>
           <pc:docMk/>
           <pc:sldMk cId="710416380" sldId="315"/>
         </pc:sldMkLst>
         <pc:spChg chg="mod">
-          <ac:chgData name="Cynthia Enciso" userId="7915927f-c5cf-4e1f-876d-e79882ad52fa" providerId="ADAL" clId="{597ECC70-4FC7-4D93-8FC5-722A12D65026}" dt="2022-03-21T21:47:05.753" v="452" actId="21"/>
+          <ac:chgData name="Cynthia Enciso" userId="7915927f-c5cf-4e1f-876d-e79882ad52fa" providerId="ADAL" clId="{73B21D03-29C7-4986-B0BA-4FA7C84A6508}" dt="2021-11-22T23:16:57.006" v="2" actId="20577"/>
           <ac:spMkLst>
             <pc:docMk/>
             <pc:sldMk cId="710416380" sldId="315"/>
-            <ac:spMk id="9" creationId="{E3740346-34EB-4B59-8E92-70472579A799}"/>
-          </ac:spMkLst>
-        </pc:spChg>
-      </pc:sldChg>
-      <pc:sldChg chg="ord">
-        <pc:chgData name="Cynthia Enciso" userId="7915927f-c5cf-4e1f-876d-e79882ad52fa" providerId="ADAL" clId="{597ECC70-4FC7-4D93-8FC5-722A12D65026}" dt="2022-03-21T22:05:31.488" v="456"/>
-        <pc:sldMkLst>
-          <pc:docMk/>
-          <pc:sldMk cId="1105799127" sldId="317"/>
-        </pc:sldMkLst>
-      </pc:sldChg>
-      <pc:sldChg chg="modSp new del mod ord">
-        <pc:chgData name="Cynthia Enciso" userId="7915927f-c5cf-4e1f-876d-e79882ad52fa" providerId="ADAL" clId="{597ECC70-4FC7-4D93-8FC5-722A12D65026}" dt="2022-03-09T18:34:59.518" v="431" actId="47"/>
-        <pc:sldMkLst>
-          <pc:docMk/>
-          <pc:sldMk cId="240240689" sldId="318"/>
-        </pc:sldMkLst>
-        <pc:spChg chg="mod">
-          <ac:chgData name="Cynthia Enciso" userId="7915927f-c5cf-4e1f-876d-e79882ad52fa" providerId="ADAL" clId="{597ECC70-4FC7-4D93-8FC5-722A12D65026}" dt="2022-02-21T21:22:24.874" v="5" actId="20577"/>
-          <ac:spMkLst>
-            <pc:docMk/>
-            <pc:sldMk cId="240240689" sldId="318"/>
-            <ac:spMk id="3" creationId="{74185A2C-4037-45EB-A9FC-3F2AC0449BB2}"/>
-          </ac:spMkLst>
-        </pc:spChg>
-        <pc:spChg chg="mod">
-          <ac:chgData name="Cynthia Enciso" userId="7915927f-c5cf-4e1f-876d-e79882ad52fa" providerId="ADAL" clId="{597ECC70-4FC7-4D93-8FC5-722A12D65026}" dt="2022-02-21T22:00:03.236" v="331" actId="20577"/>
-          <ac:spMkLst>
-            <pc:docMk/>
-            <pc:sldMk cId="240240689" sldId="318"/>
-            <ac:spMk id="4" creationId="{FE9F8E35-6D5C-4F75-8518-63D9A4D46BAC}"/>
-          </ac:spMkLst>
-        </pc:spChg>
-      </pc:sldChg>
-      <pc:sldChg chg="modSp new del mod ord">
-        <pc:chgData name="Cynthia Enciso" userId="7915927f-c5cf-4e1f-876d-e79882ad52fa" providerId="ADAL" clId="{597ECC70-4FC7-4D93-8FC5-722A12D65026}" dt="2022-03-09T18:35:04.684" v="432" actId="47"/>
-        <pc:sldMkLst>
-          <pc:docMk/>
-          <pc:sldMk cId="2208075587" sldId="319"/>
-        </pc:sldMkLst>
-        <pc:spChg chg="mod">
-          <ac:chgData name="Cynthia Enciso" userId="7915927f-c5cf-4e1f-876d-e79882ad52fa" providerId="ADAL" clId="{597ECC70-4FC7-4D93-8FC5-722A12D65026}" dt="2022-02-21T21:23:29.954" v="224" actId="20577"/>
-          <ac:spMkLst>
-            <pc:docMk/>
-            <pc:sldMk cId="2208075587" sldId="319"/>
-            <ac:spMk id="3" creationId="{AFC8D289-E77D-4D11-8840-4A4258E14D9D}"/>
-          </ac:spMkLst>
-        </pc:spChg>
-        <pc:spChg chg="mod">
-          <ac:chgData name="Cynthia Enciso" userId="7915927f-c5cf-4e1f-876d-e79882ad52fa" providerId="ADAL" clId="{597ECC70-4FC7-4D93-8FC5-722A12D65026}" dt="2022-02-21T21:23:40.168" v="254" actId="20577"/>
-          <ac:spMkLst>
-            <pc:docMk/>
-            <pc:sldMk cId="2208075587" sldId="319"/>
-            <ac:spMk id="4" creationId="{FDE8300F-6FFE-4D21-9271-65E09AF0DC4C}"/>
+            <ac:spMk id="14" creationId="{391BB88A-0678-4D74-B1D4-4729A8328E90}"/>
           </ac:spMkLst>
         </pc:spChg>
       </pc:sldChg>
@@ -1980,35 +1904,35 @@
     </pc:docChg>
   </pc:docChgLst>
   <pc:docChgLst>
-    <pc:chgData name="Cynthia Enciso" userId="7915927f-c5cf-4e1f-876d-e79882ad52fa" providerId="ADAL" clId="{DE83FFC9-65A1-4D5A-AC16-1F63326FD5B3}"/>
-    <pc:docChg chg="custSel modSld sldOrd">
-      <pc:chgData name="Cynthia Enciso" userId="7915927f-c5cf-4e1f-876d-e79882ad52fa" providerId="ADAL" clId="{DE83FFC9-65A1-4D5A-AC16-1F63326FD5B3}" dt="2021-04-26T21:18:34.525" v="228" actId="20577"/>
+    <pc:chgData name="Cynthia Enciso" userId="7915927f-c5cf-4e1f-876d-e79882ad52fa" providerId="ADAL" clId="{597ECC70-4FC7-4D93-8FC5-722A12D65026}"/>
+    <pc:docChg chg="undo custSel addSld delSld modSld sldOrd">
+      <pc:chgData name="Cynthia Enciso" userId="7915927f-c5cf-4e1f-876d-e79882ad52fa" providerId="ADAL" clId="{597ECC70-4FC7-4D93-8FC5-722A12D65026}" dt="2022-03-21T22:05:31.488" v="456"/>
       <pc:docMkLst>
         <pc:docMk/>
       </pc:docMkLst>
       <pc:sldChg chg="modSp mod">
-        <pc:chgData name="Cynthia Enciso" userId="7915927f-c5cf-4e1f-876d-e79882ad52fa" providerId="ADAL" clId="{DE83FFC9-65A1-4D5A-AC16-1F63326FD5B3}" dt="2021-04-26T21:18:34.525" v="228" actId="20577"/>
+        <pc:chgData name="Cynthia Enciso" userId="7915927f-c5cf-4e1f-876d-e79882ad52fa" providerId="ADAL" clId="{597ECC70-4FC7-4D93-8FC5-722A12D65026}" dt="2022-02-21T21:35:59.267" v="266" actId="20577"/>
         <pc:sldMkLst>
           <pc:docMk/>
-          <pc:sldMk cId="2239329120" sldId="260"/>
+          <pc:sldMk cId="384837883" sldId="261"/>
         </pc:sldMkLst>
         <pc:spChg chg="mod">
-          <ac:chgData name="Cynthia Enciso" userId="7915927f-c5cf-4e1f-876d-e79882ad52fa" providerId="ADAL" clId="{DE83FFC9-65A1-4D5A-AC16-1F63326FD5B3}" dt="2021-04-26T21:18:34.525" v="228" actId="20577"/>
+          <ac:chgData name="Cynthia Enciso" userId="7915927f-c5cf-4e1f-876d-e79882ad52fa" providerId="ADAL" clId="{597ECC70-4FC7-4D93-8FC5-722A12D65026}" dt="2022-02-21T21:35:59.267" v="266" actId="20577"/>
           <ac:spMkLst>
             <pc:docMk/>
-            <pc:sldMk cId="2239329120" sldId="260"/>
-            <ac:spMk id="3" creationId="{3F42FAFD-56E3-49A6-87C2-06ABA142F389}"/>
+            <pc:sldMk cId="384837883" sldId="261"/>
+            <ac:spMk id="3" creationId="{58E352E8-4AD7-4404-8075-D6F4C5358A96}"/>
           </ac:spMkLst>
         </pc:spChg>
       </pc:sldChg>
-      <pc:sldChg chg="modSp mod ord">
-        <pc:chgData name="Cynthia Enciso" userId="7915927f-c5cf-4e1f-876d-e79882ad52fa" providerId="ADAL" clId="{DE83FFC9-65A1-4D5A-AC16-1F63326FD5B3}" dt="2021-04-26T21:11:19.439" v="122" actId="20577"/>
+      <pc:sldChg chg="modSp mod">
+        <pc:chgData name="Cynthia Enciso" userId="7915927f-c5cf-4e1f-876d-e79882ad52fa" providerId="ADAL" clId="{597ECC70-4FC7-4D93-8FC5-722A12D65026}" dt="2022-03-02T18:06:52.949" v="430" actId="20577"/>
         <pc:sldMkLst>
           <pc:docMk/>
           <pc:sldMk cId="3605997529" sldId="262"/>
         </pc:sldMkLst>
         <pc:spChg chg="mod">
-          <ac:chgData name="Cynthia Enciso" userId="7915927f-c5cf-4e1f-876d-e79882ad52fa" providerId="ADAL" clId="{DE83FFC9-65A1-4D5A-AC16-1F63326FD5B3}" dt="2021-04-26T21:11:19.439" v="122" actId="20577"/>
+          <ac:chgData name="Cynthia Enciso" userId="7915927f-c5cf-4e1f-876d-e79882ad52fa" providerId="ADAL" clId="{597ECC70-4FC7-4D93-8FC5-722A12D65026}" dt="2022-03-02T18:06:52.949" v="430" actId="20577"/>
           <ac:spMkLst>
             <pc:docMk/>
             <pc:sldMk cId="3605997529" sldId="262"/>
@@ -2016,27 +1940,103 @@
           </ac:spMkLst>
         </pc:spChg>
       </pc:sldChg>
-      <pc:sldChg chg="modSp mod ord">
-        <pc:chgData name="Cynthia Enciso" userId="7915927f-c5cf-4e1f-876d-e79882ad52fa" providerId="ADAL" clId="{DE83FFC9-65A1-4D5A-AC16-1F63326FD5B3}" dt="2021-04-26T21:16:35.510" v="186" actId="27636"/>
+      <pc:sldChg chg="modSp mod">
+        <pc:chgData name="Cynthia Enciso" userId="7915927f-c5cf-4e1f-876d-e79882ad52fa" providerId="ADAL" clId="{597ECC70-4FC7-4D93-8FC5-722A12D65026}" dt="2022-03-21T21:12:51.447" v="442" actId="20577"/>
         <pc:sldMkLst>
           <pc:docMk/>
-          <pc:sldMk cId="1933041044" sldId="265"/>
+          <pc:sldMk cId="608514704" sldId="312"/>
         </pc:sldMkLst>
         <pc:spChg chg="mod">
-          <ac:chgData name="Cynthia Enciso" userId="7915927f-c5cf-4e1f-876d-e79882ad52fa" providerId="ADAL" clId="{DE83FFC9-65A1-4D5A-AC16-1F63326FD5B3}" dt="2021-04-26T21:16:35.510" v="186" actId="27636"/>
+          <ac:chgData name="Cynthia Enciso" userId="7915927f-c5cf-4e1f-876d-e79882ad52fa" providerId="ADAL" clId="{597ECC70-4FC7-4D93-8FC5-722A12D65026}" dt="2022-03-21T21:12:51.447" v="442" actId="20577"/>
           <ac:spMkLst>
             <pc:docMk/>
-            <pc:sldMk cId="1933041044" sldId="265"/>
-            <ac:spMk id="3" creationId="{6FFA52D6-4156-44B1-A892-2180884273BC}"/>
+            <pc:sldMk cId="608514704" sldId="312"/>
+            <ac:spMk id="7" creationId="{16DB0091-3EA4-4B1A-8A2D-5754F6476AD9}"/>
+          </ac:spMkLst>
+        </pc:spChg>
+      </pc:sldChg>
+      <pc:sldChg chg="modSp mod">
+        <pc:chgData name="Cynthia Enciso" userId="7915927f-c5cf-4e1f-876d-e79882ad52fa" providerId="ADAL" clId="{597ECC70-4FC7-4D93-8FC5-722A12D65026}" dt="2022-03-21T21:17:21.831" v="450" actId="20577"/>
+        <pc:sldMkLst>
+          <pc:docMk/>
+          <pc:sldMk cId="455569934" sldId="313"/>
+        </pc:sldMkLst>
+        <pc:spChg chg="mod">
+          <ac:chgData name="Cynthia Enciso" userId="7915927f-c5cf-4e1f-876d-e79882ad52fa" providerId="ADAL" clId="{597ECC70-4FC7-4D93-8FC5-722A12D65026}" dt="2022-03-21T21:17:21.831" v="450" actId="20577"/>
+          <ac:spMkLst>
+            <pc:docMk/>
+            <pc:sldMk cId="455569934" sldId="313"/>
+            <ac:spMk id="10" creationId="{219770C9-6574-43D3-95DD-A2A10A98B2E2}"/>
+          </ac:spMkLst>
+        </pc:spChg>
+      </pc:sldChg>
+      <pc:sldChg chg="modSp mod">
+        <pc:chgData name="Cynthia Enciso" userId="7915927f-c5cf-4e1f-876d-e79882ad52fa" providerId="ADAL" clId="{597ECC70-4FC7-4D93-8FC5-722A12D65026}" dt="2022-03-21T21:47:05.753" v="452" actId="21"/>
+        <pc:sldMkLst>
+          <pc:docMk/>
+          <pc:sldMk cId="710416380" sldId="315"/>
+        </pc:sldMkLst>
+        <pc:spChg chg="mod">
+          <ac:chgData name="Cynthia Enciso" userId="7915927f-c5cf-4e1f-876d-e79882ad52fa" providerId="ADAL" clId="{597ECC70-4FC7-4D93-8FC5-722A12D65026}" dt="2022-03-21T21:47:05.753" v="452" actId="21"/>
+          <ac:spMkLst>
+            <pc:docMk/>
+            <pc:sldMk cId="710416380" sldId="315"/>
+            <ac:spMk id="9" creationId="{E3740346-34EB-4B59-8E92-70472579A799}"/>
           </ac:spMkLst>
         </pc:spChg>
       </pc:sldChg>
       <pc:sldChg chg="ord">
-        <pc:chgData name="Cynthia Enciso" userId="7915927f-c5cf-4e1f-876d-e79882ad52fa" providerId="ADAL" clId="{DE83FFC9-65A1-4D5A-AC16-1F63326FD5B3}" dt="2021-04-01T20:18:57.604" v="1"/>
+        <pc:chgData name="Cynthia Enciso" userId="7915927f-c5cf-4e1f-876d-e79882ad52fa" providerId="ADAL" clId="{597ECC70-4FC7-4D93-8FC5-722A12D65026}" dt="2022-03-21T22:05:31.488" v="456"/>
         <pc:sldMkLst>
           <pc:docMk/>
-          <pc:sldMk cId="1944234847" sldId="301"/>
+          <pc:sldMk cId="1105799127" sldId="317"/>
         </pc:sldMkLst>
+      </pc:sldChg>
+      <pc:sldChg chg="modSp new del mod ord">
+        <pc:chgData name="Cynthia Enciso" userId="7915927f-c5cf-4e1f-876d-e79882ad52fa" providerId="ADAL" clId="{597ECC70-4FC7-4D93-8FC5-722A12D65026}" dt="2022-03-09T18:34:59.518" v="431" actId="47"/>
+        <pc:sldMkLst>
+          <pc:docMk/>
+          <pc:sldMk cId="240240689" sldId="318"/>
+        </pc:sldMkLst>
+        <pc:spChg chg="mod">
+          <ac:chgData name="Cynthia Enciso" userId="7915927f-c5cf-4e1f-876d-e79882ad52fa" providerId="ADAL" clId="{597ECC70-4FC7-4D93-8FC5-722A12D65026}" dt="2022-02-21T21:22:24.874" v="5" actId="20577"/>
+          <ac:spMkLst>
+            <pc:docMk/>
+            <pc:sldMk cId="240240689" sldId="318"/>
+            <ac:spMk id="3" creationId="{74185A2C-4037-45EB-A9FC-3F2AC0449BB2}"/>
+          </ac:spMkLst>
+        </pc:spChg>
+        <pc:spChg chg="mod">
+          <ac:chgData name="Cynthia Enciso" userId="7915927f-c5cf-4e1f-876d-e79882ad52fa" providerId="ADAL" clId="{597ECC70-4FC7-4D93-8FC5-722A12D65026}" dt="2022-02-21T22:00:03.236" v="331" actId="20577"/>
+          <ac:spMkLst>
+            <pc:docMk/>
+            <pc:sldMk cId="240240689" sldId="318"/>
+            <ac:spMk id="4" creationId="{FE9F8E35-6D5C-4F75-8518-63D9A4D46BAC}"/>
+          </ac:spMkLst>
+        </pc:spChg>
+      </pc:sldChg>
+      <pc:sldChg chg="modSp new del mod ord">
+        <pc:chgData name="Cynthia Enciso" userId="7915927f-c5cf-4e1f-876d-e79882ad52fa" providerId="ADAL" clId="{597ECC70-4FC7-4D93-8FC5-722A12D65026}" dt="2022-03-09T18:35:04.684" v="432" actId="47"/>
+        <pc:sldMkLst>
+          <pc:docMk/>
+          <pc:sldMk cId="2208075587" sldId="319"/>
+        </pc:sldMkLst>
+        <pc:spChg chg="mod">
+          <ac:chgData name="Cynthia Enciso" userId="7915927f-c5cf-4e1f-876d-e79882ad52fa" providerId="ADAL" clId="{597ECC70-4FC7-4D93-8FC5-722A12D65026}" dt="2022-02-21T21:23:29.954" v="224" actId="20577"/>
+          <ac:spMkLst>
+            <pc:docMk/>
+            <pc:sldMk cId="2208075587" sldId="319"/>
+            <ac:spMk id="3" creationId="{AFC8D289-E77D-4D11-8840-4A4258E14D9D}"/>
+          </ac:spMkLst>
+        </pc:spChg>
+        <pc:spChg chg="mod">
+          <ac:chgData name="Cynthia Enciso" userId="7915927f-c5cf-4e1f-876d-e79882ad52fa" providerId="ADAL" clId="{597ECC70-4FC7-4D93-8FC5-722A12D65026}" dt="2022-02-21T21:23:40.168" v="254" actId="20577"/>
+          <ac:spMkLst>
+            <pc:docMk/>
+            <pc:sldMk cId="2208075587" sldId="319"/>
+            <ac:spMk id="4" creationId="{FDE8300F-6FFE-4D21-9271-65E09AF0DC4C}"/>
+          </ac:spMkLst>
+        </pc:spChg>
       </pc:sldChg>
     </pc:docChg>
   </pc:docChgLst>
@@ -2124,7 +2124,7 @@
           </a:lstStyle>
           <a:p>
             <a:fld id="{CA869C63-99CE-7C40-A7E9-3930C61B23AB}" type="datetimeFigureOut">
-              <a:t>3/21/2022</a:t>
+              <a:t>4/11/2022</a:t>
             </a:fld>
             <a:endParaRPr lang="en-US" dirty="0"/>
           </a:p>
@@ -2289,7 +2289,7 @@
           <a:p>
             <a:fld id="{E3E59D94-626A-4CE8-9932-5221A04BF234}" type="datetimeFigureOut">
               <a:rPr lang="en-US" smtClean="0"/>
-              <a:t>3/21/2022</a:t>
+              <a:t>4/11/2022</a:t>
             </a:fld>
             <a:endParaRPr lang="en-US" dirty="0"/>
           </a:p>
@@ -38844,6 +38844,1117 @@
           <p:cNvPr id="2" name="Title 1">
             <a:extLst>
               <a:ext uri="{FF2B5EF4-FFF2-40B4-BE49-F238E27FC236}">
+                <a16:creationId xmlns:a16="http://schemas.microsoft.com/office/drawing/2014/main" id="{6614579F-5B60-4A35-B5E6-51125F7380E4}"/>
+              </a:ext>
+            </a:extLst>
+          </p:cNvPr>
+          <p:cNvSpPr>
+            <a:spLocks noGrp="1"/>
+          </p:cNvSpPr>
+          <p:nvPr>
+            <p:ph type="title"/>
+          </p:nvPr>
+        </p:nvSpPr>
+        <p:spPr/>
+        <p:txBody>
+          <a:bodyPr/>
+          <a:lstStyle/>
+          <a:p>
+            <a:r>
+              <a:rPr lang="en-US" dirty="0"/>
+              <a:t>Using Variables</a:t>
+            </a:r>
+          </a:p>
+        </p:txBody>
+      </p:sp>
+      <p:sp>
+        <p:nvSpPr>
+          <p:cNvPr id="3" name="Content Placeholder 2">
+            <a:extLst>
+              <a:ext uri="{FF2B5EF4-FFF2-40B4-BE49-F238E27FC236}">
+                <a16:creationId xmlns:a16="http://schemas.microsoft.com/office/drawing/2014/main" id="{3806DEF6-3785-4BAC-9C3B-BDFAE1DA8C03}"/>
+              </a:ext>
+            </a:extLst>
+          </p:cNvPr>
+          <p:cNvSpPr>
+            <a:spLocks noGrp="1"/>
+          </p:cNvSpPr>
+          <p:nvPr>
+            <p:ph idx="1"/>
+          </p:nvPr>
+        </p:nvSpPr>
+        <p:spPr>
+          <a:xfrm>
+            <a:off x="380010" y="1481446"/>
+            <a:ext cx="8383980" cy="5098258"/>
+          </a:xfrm>
+        </p:spPr>
+        <p:txBody>
+          <a:bodyPr>
+            <a:normAutofit/>
+          </a:bodyPr>
+          <a:lstStyle/>
+          <a:p>
+            <a:r>
+              <a:rPr lang="en-US" dirty="0"/>
+              <a:t>Variables can hold different </a:t>
+            </a:r>
+            <a:r>
+              <a:rPr lang="en-US" i="1" dirty="0"/>
+              <a:t>types</a:t>
+            </a:r>
+            <a:r>
+              <a:rPr lang="en-US" dirty="0"/>
+              <a:t> of data.</a:t>
+            </a:r>
+          </a:p>
+          <a:p>
+            <a:pPr lvl="1"/>
+            <a:r>
+              <a:rPr lang="en-US" dirty="0"/>
+              <a:t>Numbers, Strings (of characters), true/false, etc.</a:t>
+            </a:r>
+          </a:p>
+          <a:p>
+            <a:r>
+              <a:rPr lang="en-US" dirty="0"/>
+              <a:t>You can assign a variable data to hold by </a:t>
+            </a:r>
+            <a:r>
+              <a:rPr lang="en-US" b="1" dirty="0"/>
+              <a:t>initialization or re-assignment.</a:t>
+            </a:r>
+            <a:endParaRPr lang="en-US" dirty="0"/>
+          </a:p>
+          <a:p>
+            <a:pPr lvl="1"/>
+            <a:r>
+              <a:rPr lang="en-US" b="1" dirty="0"/>
+              <a:t>Initialization: </a:t>
+            </a:r>
+            <a:r>
+              <a:rPr lang="en-US" dirty="0"/>
+              <a:t>giving a variable an initial value</a:t>
+            </a:r>
+          </a:p>
+          <a:p>
+            <a:pPr lvl="1"/>
+            <a:r>
+              <a:rPr lang="en-US" b="1" dirty="0"/>
+              <a:t>Re-assignment: </a:t>
+            </a:r>
+            <a:r>
+              <a:rPr lang="en-US" dirty="0"/>
+              <a:t>giving a variable a new, different value than what it previously had</a:t>
+            </a:r>
+          </a:p>
+          <a:p>
+            <a:endParaRPr lang="en-US" dirty="0"/>
+          </a:p>
+        </p:txBody>
+      </p:sp>
+      <p:sp>
+        <p:nvSpPr>
+          <p:cNvPr id="4" name="Slide Number Placeholder 3">
+            <a:extLst>
+              <a:ext uri="{FF2B5EF4-FFF2-40B4-BE49-F238E27FC236}">
+                <a16:creationId xmlns:a16="http://schemas.microsoft.com/office/drawing/2014/main" id="{45624EE7-452F-48E2-B54D-9D81B188F225}"/>
+              </a:ext>
+            </a:extLst>
+          </p:cNvPr>
+          <p:cNvSpPr>
+            <a:spLocks noGrp="1"/>
+          </p:cNvSpPr>
+          <p:nvPr>
+            <p:ph type="sldNum" sz="quarter" idx="12"/>
+          </p:nvPr>
+        </p:nvSpPr>
+        <p:spPr/>
+        <p:txBody>
+          <a:bodyPr/>
+          <a:lstStyle/>
+          <a:p>
+            <a:fld id="{F6728BC2-ACA3-447C-A909-F3F49211C066}" type="slidenum">
+              <a:rPr lang="en-US" smtClean="0"/>
+              <a:pPr/>
+              <a:t>9</a:t>
+            </a:fld>
+            <a:endParaRPr lang="en-US" dirty="0"/>
+          </a:p>
+        </p:txBody>
+      </p:sp>
+    </p:spTree>
+    <p:extLst>
+      <p:ext uri="{BB962C8B-B14F-4D97-AF65-F5344CB8AC3E}">
+        <p14:creationId xmlns:p14="http://schemas.microsoft.com/office/powerpoint/2010/main" val="2441782704"/>
+      </p:ext>
+    </p:extLst>
+  </p:cSld>
+  <p:clrMapOvr>
+    <a:masterClrMapping/>
+  </p:clrMapOvr>
+</p:sld>
+</file>
+
+<file path=ppt/slides/slide11.xml><?xml version="1.0" encoding="utf-8"?>
+<p:sld xmlns:a="http://schemas.openxmlformats.org/drawingml/2006/main" xmlns:r="http://schemas.openxmlformats.org/officeDocument/2006/relationships" xmlns:p="http://schemas.openxmlformats.org/presentationml/2006/main">
+  <p:cSld>
+    <p:spTree>
+      <p:nvGrpSpPr>
+        <p:cNvPr id="1" name=""/>
+        <p:cNvGrpSpPr/>
+        <p:nvPr/>
+      </p:nvGrpSpPr>
+      <p:grpSpPr>
+        <a:xfrm>
+          <a:off x="0" y="0"/>
+          <a:ext cx="0" cy="0"/>
+          <a:chOff x="0" y="0"/>
+          <a:chExt cx="0" cy="0"/>
+        </a:xfrm>
+      </p:grpSpPr>
+      <p:sp>
+        <p:nvSpPr>
+          <p:cNvPr id="2" name="Title 1">
+            <a:extLst>
+              <a:ext uri="{FF2B5EF4-FFF2-40B4-BE49-F238E27FC236}">
+                <a16:creationId xmlns:a16="http://schemas.microsoft.com/office/drawing/2014/main" id="{B49433A1-1DCC-46BD-AF19-1333963435A5}"/>
+              </a:ext>
+            </a:extLst>
+          </p:cNvPr>
+          <p:cNvSpPr>
+            <a:spLocks noGrp="1"/>
+          </p:cNvSpPr>
+          <p:nvPr>
+            <p:ph type="title"/>
+          </p:nvPr>
+        </p:nvSpPr>
+        <p:spPr/>
+        <p:txBody>
+          <a:bodyPr/>
+          <a:lstStyle/>
+          <a:p>
+            <a:r>
+              <a:rPr lang="en-US" dirty="0"/>
+              <a:t>Assignment Visual</a:t>
+            </a:r>
+          </a:p>
+        </p:txBody>
+      </p:sp>
+      <p:sp>
+        <p:nvSpPr>
+          <p:cNvPr id="4" name="Slide Number Placeholder 3">
+            <a:extLst>
+              <a:ext uri="{FF2B5EF4-FFF2-40B4-BE49-F238E27FC236}">
+                <a16:creationId xmlns:a16="http://schemas.microsoft.com/office/drawing/2014/main" id="{5257505C-523C-40CD-9517-61F02B8FF0ED}"/>
+              </a:ext>
+            </a:extLst>
+          </p:cNvPr>
+          <p:cNvSpPr>
+            <a:spLocks noGrp="1"/>
+          </p:cNvSpPr>
+          <p:nvPr>
+            <p:ph type="sldNum" sz="quarter" idx="12"/>
+          </p:nvPr>
+        </p:nvSpPr>
+        <p:spPr/>
+        <p:txBody>
+          <a:bodyPr/>
+          <a:lstStyle/>
+          <a:p>
+            <a:fld id="{F6728BC2-ACA3-447C-A909-F3F49211C066}" type="slidenum">
+              <a:rPr lang="en-US" smtClean="0"/>
+              <a:pPr/>
+              <a:t>10</a:t>
+            </a:fld>
+            <a:endParaRPr lang="en-US" dirty="0"/>
+          </a:p>
+        </p:txBody>
+      </p:sp>
+      <p:sp>
+        <p:nvSpPr>
+          <p:cNvPr id="5" name="Rectangle: Rounded Corners 4">
+            <a:extLst>
+              <a:ext uri="{FF2B5EF4-FFF2-40B4-BE49-F238E27FC236}">
+                <a16:creationId xmlns:a16="http://schemas.microsoft.com/office/drawing/2014/main" id="{C72B6229-1DAC-4330-A3C5-0D3754C11367}"/>
+              </a:ext>
+            </a:extLst>
+          </p:cNvPr>
+          <p:cNvSpPr/>
+          <p:nvPr/>
+        </p:nvSpPr>
+        <p:spPr>
+          <a:xfrm>
+            <a:off x="193810" y="1480931"/>
+            <a:ext cx="8790618" cy="1431234"/>
+          </a:xfrm>
+          <a:prstGeom prst="roundRect">
+            <a:avLst/>
+          </a:prstGeom>
+          <a:solidFill>
+            <a:schemeClr val="accent1">
+              <a:lumMod val="20000"/>
+              <a:lumOff val="80000"/>
+            </a:schemeClr>
+          </a:solidFill>
+        </p:spPr>
+        <p:style>
+          <a:lnRef idx="2">
+            <a:schemeClr val="accent1">
+              <a:shade val="50000"/>
+            </a:schemeClr>
+          </a:lnRef>
+          <a:fillRef idx="1">
+            <a:schemeClr val="accent1"/>
+          </a:fillRef>
+          <a:effectRef idx="0">
+            <a:schemeClr val="accent1"/>
+          </a:effectRef>
+          <a:fontRef idx="minor">
+            <a:schemeClr val="lt1"/>
+          </a:fontRef>
+        </p:style>
+        <p:txBody>
+          <a:bodyPr rtlCol="0" anchor="ctr"/>
+          <a:lstStyle/>
+          <a:p>
+            <a:pPr algn="ctr"/>
+            <a:endParaRPr lang="en-US"/>
+          </a:p>
+        </p:txBody>
+      </p:sp>
+      <p:sp>
+        <p:nvSpPr>
+          <p:cNvPr id="6" name="Rectangle: Rounded Corners 5">
+            <a:extLst>
+              <a:ext uri="{FF2B5EF4-FFF2-40B4-BE49-F238E27FC236}">
+                <a16:creationId xmlns:a16="http://schemas.microsoft.com/office/drawing/2014/main" id="{EA5A7E6C-551F-45EE-9FB4-61D87BDD1BCC}"/>
+              </a:ext>
+            </a:extLst>
+          </p:cNvPr>
+          <p:cNvSpPr/>
+          <p:nvPr/>
+        </p:nvSpPr>
+        <p:spPr>
+          <a:xfrm>
+            <a:off x="193812" y="3297984"/>
+            <a:ext cx="8790616" cy="1431235"/>
+          </a:xfrm>
+          <a:prstGeom prst="roundRect">
+            <a:avLst/>
+          </a:prstGeom>
+          <a:solidFill>
+            <a:schemeClr val="accent1">
+              <a:lumMod val="20000"/>
+              <a:lumOff val="80000"/>
+            </a:schemeClr>
+          </a:solidFill>
+        </p:spPr>
+        <p:style>
+          <a:lnRef idx="2">
+            <a:schemeClr val="accent1">
+              <a:shade val="50000"/>
+            </a:schemeClr>
+          </a:lnRef>
+          <a:fillRef idx="1">
+            <a:schemeClr val="accent1"/>
+          </a:fillRef>
+          <a:effectRef idx="0">
+            <a:schemeClr val="accent1"/>
+          </a:effectRef>
+          <a:fontRef idx="minor">
+            <a:schemeClr val="lt1"/>
+          </a:fontRef>
+        </p:style>
+        <p:txBody>
+          <a:bodyPr rtlCol="0" anchor="ctr"/>
+          <a:lstStyle/>
+          <a:p>
+            <a:pPr algn="ctr"/>
+            <a:endParaRPr lang="en-US"/>
+          </a:p>
+        </p:txBody>
+      </p:sp>
+      <p:sp>
+        <p:nvSpPr>
+          <p:cNvPr id="7" name="Rectangle: Rounded Corners 6">
+            <a:extLst>
+              <a:ext uri="{FF2B5EF4-FFF2-40B4-BE49-F238E27FC236}">
+                <a16:creationId xmlns:a16="http://schemas.microsoft.com/office/drawing/2014/main" id="{BAE607B7-2DAC-41D7-9E70-C0FCB604872D}"/>
+              </a:ext>
+            </a:extLst>
+          </p:cNvPr>
+          <p:cNvSpPr/>
+          <p:nvPr/>
+        </p:nvSpPr>
+        <p:spPr>
+          <a:xfrm>
+            <a:off x="191987" y="5115039"/>
+            <a:ext cx="8760026" cy="1431235"/>
+          </a:xfrm>
+          <a:prstGeom prst="roundRect">
+            <a:avLst/>
+          </a:prstGeom>
+          <a:solidFill>
+            <a:schemeClr val="accent1">
+              <a:lumMod val="20000"/>
+              <a:lumOff val="80000"/>
+            </a:schemeClr>
+          </a:solidFill>
+        </p:spPr>
+        <p:style>
+          <a:lnRef idx="2">
+            <a:schemeClr val="accent1">
+              <a:shade val="50000"/>
+            </a:schemeClr>
+          </a:lnRef>
+          <a:fillRef idx="1">
+            <a:schemeClr val="accent1"/>
+          </a:fillRef>
+          <a:effectRef idx="0">
+            <a:schemeClr val="accent1"/>
+          </a:effectRef>
+          <a:fontRef idx="minor">
+            <a:schemeClr val="lt1"/>
+          </a:fontRef>
+        </p:style>
+        <p:txBody>
+          <a:bodyPr rtlCol="0" anchor="ctr"/>
+          <a:lstStyle/>
+          <a:p>
+            <a:pPr algn="ctr"/>
+            <a:endParaRPr lang="en-US"/>
+          </a:p>
+        </p:txBody>
+      </p:sp>
+      <p:sp>
+        <p:nvSpPr>
+          <p:cNvPr id="14" name="Rectangle: Rounded Corners 13">
+            <a:extLst>
+              <a:ext uri="{FF2B5EF4-FFF2-40B4-BE49-F238E27FC236}">
+                <a16:creationId xmlns:a16="http://schemas.microsoft.com/office/drawing/2014/main" id="{1839A7D8-95BC-4F7B-BC98-5CA51010CDEB}"/>
+              </a:ext>
+            </a:extLst>
+          </p:cNvPr>
+          <p:cNvSpPr/>
+          <p:nvPr/>
+        </p:nvSpPr>
+        <p:spPr>
+          <a:xfrm>
+            <a:off x="207433" y="1491623"/>
+            <a:ext cx="4584700" cy="1409068"/>
+          </a:xfrm>
+          <a:prstGeom prst="roundRect">
+            <a:avLst/>
+          </a:prstGeom>
+          <a:solidFill>
+            <a:schemeClr val="accent1"/>
+          </a:solidFill>
+          <a:ln>
+            <a:noFill/>
+          </a:ln>
+        </p:spPr>
+        <p:style>
+          <a:lnRef idx="0">
+            <a:scrgbClr r="0" g="0" b="0"/>
+          </a:lnRef>
+          <a:fillRef idx="0">
+            <a:scrgbClr r="0" g="0" b="0"/>
+          </a:fillRef>
+          <a:effectRef idx="0">
+            <a:scrgbClr r="0" g="0" b="0"/>
+          </a:effectRef>
+          <a:fontRef idx="minor">
+            <a:schemeClr val="lt1"/>
+          </a:fontRef>
+        </p:style>
+        <p:txBody>
+          <a:bodyPr rtlCol="0" anchor="ctr"/>
+          <a:lstStyle/>
+          <a:p>
+            <a:pPr algn="ctr"/>
+            <a:endParaRPr lang="en-US"/>
+          </a:p>
+        </p:txBody>
+      </p:sp>
+      <p:sp>
+        <p:nvSpPr>
+          <p:cNvPr id="15" name="Rectangle 14">
+            <a:extLst>
+              <a:ext uri="{FF2B5EF4-FFF2-40B4-BE49-F238E27FC236}">
+                <a16:creationId xmlns:a16="http://schemas.microsoft.com/office/drawing/2014/main" id="{E18B4BFD-B7E7-44B0-868A-AADFE515101B}"/>
+              </a:ext>
+            </a:extLst>
+          </p:cNvPr>
+          <p:cNvSpPr/>
+          <p:nvPr/>
+        </p:nvSpPr>
+        <p:spPr>
+          <a:xfrm>
+            <a:off x="4583113" y="1488052"/>
+            <a:ext cx="525802" cy="1409068"/>
+          </a:xfrm>
+          <a:prstGeom prst="rect">
+            <a:avLst/>
+          </a:prstGeom>
+          <a:solidFill>
+            <a:schemeClr val="accent1">
+              <a:lumMod val="20000"/>
+              <a:lumOff val="80000"/>
+            </a:schemeClr>
+          </a:solidFill>
+          <a:ln>
+            <a:noFill/>
+          </a:ln>
+        </p:spPr>
+        <p:style>
+          <a:lnRef idx="0">
+            <a:scrgbClr r="0" g="0" b="0"/>
+          </a:lnRef>
+          <a:fillRef idx="0">
+            <a:scrgbClr r="0" g="0" b="0"/>
+          </a:fillRef>
+          <a:effectRef idx="0">
+            <a:scrgbClr r="0" g="0" b="0"/>
+          </a:effectRef>
+          <a:fontRef idx="minor">
+            <a:schemeClr val="lt1"/>
+          </a:fontRef>
+        </p:style>
+        <p:txBody>
+          <a:bodyPr rtlCol="0" anchor="ctr"/>
+          <a:lstStyle/>
+          <a:p>
+            <a:pPr algn="ctr"/>
+            <a:endParaRPr lang="en-US"/>
+          </a:p>
+        </p:txBody>
+      </p:sp>
+      <p:sp>
+        <p:nvSpPr>
+          <p:cNvPr id="18" name="Rectangle: Rounded Corners 17">
+            <a:extLst>
+              <a:ext uri="{FF2B5EF4-FFF2-40B4-BE49-F238E27FC236}">
+                <a16:creationId xmlns:a16="http://schemas.microsoft.com/office/drawing/2014/main" id="{6D9ED600-A942-4755-BB6A-6CA0CC107A18}"/>
+              </a:ext>
+            </a:extLst>
+          </p:cNvPr>
+          <p:cNvSpPr/>
+          <p:nvPr/>
+        </p:nvSpPr>
+        <p:spPr>
+          <a:xfrm>
+            <a:off x="207433" y="3309458"/>
+            <a:ext cx="4584700" cy="1409068"/>
+          </a:xfrm>
+          <a:prstGeom prst="roundRect">
+            <a:avLst/>
+          </a:prstGeom>
+          <a:solidFill>
+            <a:schemeClr val="accent1"/>
+          </a:solidFill>
+          <a:ln>
+            <a:noFill/>
+          </a:ln>
+        </p:spPr>
+        <p:style>
+          <a:lnRef idx="0">
+            <a:scrgbClr r="0" g="0" b="0"/>
+          </a:lnRef>
+          <a:fillRef idx="0">
+            <a:scrgbClr r="0" g="0" b="0"/>
+          </a:fillRef>
+          <a:effectRef idx="0">
+            <a:scrgbClr r="0" g="0" b="0"/>
+          </a:effectRef>
+          <a:fontRef idx="minor">
+            <a:schemeClr val="lt1"/>
+          </a:fontRef>
+        </p:style>
+        <p:txBody>
+          <a:bodyPr rtlCol="0" anchor="ctr"/>
+          <a:lstStyle/>
+          <a:p>
+            <a:pPr algn="ctr"/>
+            <a:endParaRPr lang="en-US"/>
+          </a:p>
+        </p:txBody>
+      </p:sp>
+      <p:sp>
+        <p:nvSpPr>
+          <p:cNvPr id="19" name="Rectangle 18">
+            <a:extLst>
+              <a:ext uri="{FF2B5EF4-FFF2-40B4-BE49-F238E27FC236}">
+                <a16:creationId xmlns:a16="http://schemas.microsoft.com/office/drawing/2014/main" id="{28F43B71-28B9-4E0D-AA55-34F036682DC5}"/>
+              </a:ext>
+            </a:extLst>
+          </p:cNvPr>
+          <p:cNvSpPr/>
+          <p:nvPr/>
+        </p:nvSpPr>
+        <p:spPr>
+          <a:xfrm>
+            <a:off x="4624861" y="3297984"/>
+            <a:ext cx="484054" cy="1409068"/>
+          </a:xfrm>
+          <a:prstGeom prst="rect">
+            <a:avLst/>
+          </a:prstGeom>
+          <a:solidFill>
+            <a:schemeClr val="accent1">
+              <a:lumMod val="20000"/>
+              <a:lumOff val="80000"/>
+            </a:schemeClr>
+          </a:solidFill>
+          <a:ln>
+            <a:noFill/>
+          </a:ln>
+        </p:spPr>
+        <p:style>
+          <a:lnRef idx="0">
+            <a:scrgbClr r="0" g="0" b="0"/>
+          </a:lnRef>
+          <a:fillRef idx="0">
+            <a:scrgbClr r="0" g="0" b="0"/>
+          </a:fillRef>
+          <a:effectRef idx="0">
+            <a:scrgbClr r="0" g="0" b="0"/>
+          </a:effectRef>
+          <a:fontRef idx="minor">
+            <a:schemeClr val="lt1"/>
+          </a:fontRef>
+        </p:style>
+        <p:txBody>
+          <a:bodyPr rtlCol="0" anchor="ctr"/>
+          <a:lstStyle/>
+          <a:p>
+            <a:pPr algn="ctr"/>
+            <a:endParaRPr lang="en-US"/>
+          </a:p>
+        </p:txBody>
+      </p:sp>
+      <p:sp>
+        <p:nvSpPr>
+          <p:cNvPr id="11" name="TextBox 10">
+            <a:extLst>
+              <a:ext uri="{FF2B5EF4-FFF2-40B4-BE49-F238E27FC236}">
+                <a16:creationId xmlns:a16="http://schemas.microsoft.com/office/drawing/2014/main" id="{B2B44A43-3459-4E33-AEEB-DD752BF8989B}"/>
+              </a:ext>
+            </a:extLst>
+          </p:cNvPr>
+          <p:cNvSpPr txBox="1"/>
+          <p:nvPr/>
+        </p:nvSpPr>
+        <p:spPr>
+          <a:xfrm>
+            <a:off x="394216" y="1779795"/>
+            <a:ext cx="3446777" cy="769441"/>
+          </a:xfrm>
+          <a:prstGeom prst="rect">
+            <a:avLst/>
+          </a:prstGeom>
+          <a:noFill/>
+        </p:spPr>
+        <p:txBody>
+          <a:bodyPr wrap="square" rtlCol="0">
+            <a:spAutoFit/>
+          </a:bodyPr>
+          <a:lstStyle/>
+          <a:p>
+            <a:r>
+              <a:rPr lang="en-US" sz="4400" b="1" dirty="0"/>
+              <a:t>Initialization</a:t>
+            </a:r>
+          </a:p>
+        </p:txBody>
+      </p:sp>
+      <p:sp>
+        <p:nvSpPr>
+          <p:cNvPr id="21" name="Rectangle: Rounded Corners 20">
+            <a:extLst>
+              <a:ext uri="{FF2B5EF4-FFF2-40B4-BE49-F238E27FC236}">
+                <a16:creationId xmlns:a16="http://schemas.microsoft.com/office/drawing/2014/main" id="{006FA9B6-7DB1-48C6-90C9-DFFC3BC81BD6}"/>
+              </a:ext>
+            </a:extLst>
+          </p:cNvPr>
+          <p:cNvSpPr/>
+          <p:nvPr/>
+        </p:nvSpPr>
+        <p:spPr>
+          <a:xfrm>
+            <a:off x="194181" y="5133654"/>
+            <a:ext cx="4584700" cy="1409068"/>
+          </a:xfrm>
+          <a:prstGeom prst="roundRect">
+            <a:avLst/>
+          </a:prstGeom>
+          <a:solidFill>
+            <a:schemeClr val="accent1"/>
+          </a:solidFill>
+          <a:ln>
+            <a:noFill/>
+          </a:ln>
+        </p:spPr>
+        <p:style>
+          <a:lnRef idx="0">
+            <a:scrgbClr r="0" g="0" b="0"/>
+          </a:lnRef>
+          <a:fillRef idx="0">
+            <a:scrgbClr r="0" g="0" b="0"/>
+          </a:fillRef>
+          <a:effectRef idx="0">
+            <a:scrgbClr r="0" g="0" b="0"/>
+          </a:effectRef>
+          <a:fontRef idx="minor">
+            <a:schemeClr val="lt1"/>
+          </a:fontRef>
+        </p:style>
+        <p:txBody>
+          <a:bodyPr rtlCol="0" anchor="ctr"/>
+          <a:lstStyle/>
+          <a:p>
+            <a:pPr algn="ctr"/>
+            <a:endParaRPr lang="en-US"/>
+          </a:p>
+        </p:txBody>
+      </p:sp>
+      <p:sp>
+        <p:nvSpPr>
+          <p:cNvPr id="22" name="Rectangle 21">
+            <a:extLst>
+              <a:ext uri="{FF2B5EF4-FFF2-40B4-BE49-F238E27FC236}">
+                <a16:creationId xmlns:a16="http://schemas.microsoft.com/office/drawing/2014/main" id="{435585D2-A176-4286-9333-02832B6034CF}"/>
+              </a:ext>
+            </a:extLst>
+          </p:cNvPr>
+          <p:cNvSpPr/>
+          <p:nvPr/>
+        </p:nvSpPr>
+        <p:spPr>
+          <a:xfrm>
+            <a:off x="4624861" y="5122180"/>
+            <a:ext cx="484054" cy="1409068"/>
+          </a:xfrm>
+          <a:prstGeom prst="rect">
+            <a:avLst/>
+          </a:prstGeom>
+          <a:solidFill>
+            <a:schemeClr val="accent1">
+              <a:lumMod val="20000"/>
+              <a:lumOff val="80000"/>
+            </a:schemeClr>
+          </a:solidFill>
+          <a:ln>
+            <a:noFill/>
+          </a:ln>
+        </p:spPr>
+        <p:style>
+          <a:lnRef idx="0">
+            <a:scrgbClr r="0" g="0" b="0"/>
+          </a:lnRef>
+          <a:fillRef idx="0">
+            <a:scrgbClr r="0" g="0" b="0"/>
+          </a:fillRef>
+          <a:effectRef idx="0">
+            <a:scrgbClr r="0" g="0" b="0"/>
+          </a:effectRef>
+          <a:fontRef idx="minor">
+            <a:schemeClr val="lt1"/>
+          </a:fontRef>
+        </p:style>
+        <p:txBody>
+          <a:bodyPr rtlCol="0" anchor="ctr"/>
+          <a:lstStyle/>
+          <a:p>
+            <a:pPr algn="ctr"/>
+            <a:endParaRPr lang="en-US" dirty="0"/>
+          </a:p>
+        </p:txBody>
+      </p:sp>
+      <p:sp>
+        <p:nvSpPr>
+          <p:cNvPr id="12" name="TextBox 11">
+            <a:extLst>
+              <a:ext uri="{FF2B5EF4-FFF2-40B4-BE49-F238E27FC236}">
+                <a16:creationId xmlns:a16="http://schemas.microsoft.com/office/drawing/2014/main" id="{3FC44194-FA53-44CF-A4C2-5B4453309CBA}"/>
+              </a:ext>
+            </a:extLst>
+          </p:cNvPr>
+          <p:cNvSpPr txBox="1"/>
+          <p:nvPr/>
+        </p:nvSpPr>
+        <p:spPr>
+          <a:xfrm>
+            <a:off x="394216" y="3570407"/>
+            <a:ext cx="3414717" cy="769441"/>
+          </a:xfrm>
+          <a:prstGeom prst="rect">
+            <a:avLst/>
+          </a:prstGeom>
+          <a:noFill/>
+        </p:spPr>
+        <p:txBody>
+          <a:bodyPr wrap="none" rtlCol="0">
+            <a:spAutoFit/>
+          </a:bodyPr>
+          <a:lstStyle/>
+          <a:p>
+            <a:r>
+              <a:rPr lang="en-US" sz="4400" b="1" dirty="0"/>
+              <a:t>Assignment</a:t>
+            </a:r>
+          </a:p>
+        </p:txBody>
+      </p:sp>
+      <p:sp>
+        <p:nvSpPr>
+          <p:cNvPr id="13" name="TextBox 12">
+            <a:extLst>
+              <a:ext uri="{FF2B5EF4-FFF2-40B4-BE49-F238E27FC236}">
+                <a16:creationId xmlns:a16="http://schemas.microsoft.com/office/drawing/2014/main" id="{4E2CC632-EABA-4167-98B5-2DAE929B7D03}"/>
+              </a:ext>
+            </a:extLst>
+          </p:cNvPr>
+          <p:cNvSpPr txBox="1"/>
+          <p:nvPr/>
+        </p:nvSpPr>
+        <p:spPr>
+          <a:xfrm>
+            <a:off x="394216" y="5379540"/>
+            <a:ext cx="4230645" cy="769441"/>
+          </a:xfrm>
+          <a:prstGeom prst="rect">
+            <a:avLst/>
+          </a:prstGeom>
+          <a:noFill/>
+        </p:spPr>
+        <p:txBody>
+          <a:bodyPr wrap="none" rtlCol="0">
+            <a:spAutoFit/>
+          </a:bodyPr>
+          <a:lstStyle/>
+          <a:p>
+            <a:r>
+              <a:rPr lang="en-US" sz="4400" b="1" dirty="0"/>
+              <a:t>Re-assignment</a:t>
+            </a:r>
+          </a:p>
+        </p:txBody>
+      </p:sp>
+      <p:sp>
+        <p:nvSpPr>
+          <p:cNvPr id="8" name="TextBox 7">
+            <a:extLst>
+              <a:ext uri="{FF2B5EF4-FFF2-40B4-BE49-F238E27FC236}">
+                <a16:creationId xmlns:a16="http://schemas.microsoft.com/office/drawing/2014/main" id="{58FC0DCE-1973-4AA7-8F42-40C464C8E998}"/>
+              </a:ext>
+            </a:extLst>
+          </p:cNvPr>
+          <p:cNvSpPr txBox="1"/>
+          <p:nvPr/>
+        </p:nvSpPr>
+        <p:spPr>
+          <a:xfrm>
+            <a:off x="4751469" y="1828624"/>
+            <a:ext cx="1633781" cy="523220"/>
+          </a:xfrm>
+          <a:prstGeom prst="rect">
+            <a:avLst/>
+          </a:prstGeom>
+          <a:noFill/>
+        </p:spPr>
+        <p:txBody>
+          <a:bodyPr wrap="none" rtlCol="0">
+            <a:spAutoFit/>
+          </a:bodyPr>
+          <a:lstStyle/>
+          <a:p>
+            <a:r>
+              <a:rPr lang="en-US" sz="2800" b="1" dirty="0"/>
+              <a:t>let y = 5;</a:t>
+            </a:r>
+          </a:p>
+        </p:txBody>
+      </p:sp>
+      <p:sp>
+        <p:nvSpPr>
+          <p:cNvPr id="9" name="TextBox 8">
+            <a:extLst>
+              <a:ext uri="{FF2B5EF4-FFF2-40B4-BE49-F238E27FC236}">
+                <a16:creationId xmlns:a16="http://schemas.microsoft.com/office/drawing/2014/main" id="{968D59A1-689F-4596-AA03-6905B5D5F31C}"/>
+              </a:ext>
+            </a:extLst>
+          </p:cNvPr>
+          <p:cNvSpPr txBox="1"/>
+          <p:nvPr/>
+        </p:nvSpPr>
+        <p:spPr>
+          <a:xfrm>
+            <a:off x="4788242" y="3509283"/>
+            <a:ext cx="4209807" cy="954107"/>
+          </a:xfrm>
+          <a:prstGeom prst="rect">
+            <a:avLst/>
+          </a:prstGeom>
+          <a:noFill/>
+        </p:spPr>
+        <p:txBody>
+          <a:bodyPr wrap="none" rtlCol="0">
+            <a:spAutoFit/>
+          </a:bodyPr>
+          <a:lstStyle/>
+          <a:p>
+            <a:r>
+              <a:rPr lang="en-US" sz="2800" b="1" dirty="0"/>
+              <a:t>let </a:t>
+            </a:r>
+            <a:r>
+              <a:rPr lang="en-US" sz="2800" b="1" dirty="0" err="1"/>
+              <a:t>myName</a:t>
+            </a:r>
+            <a:r>
+              <a:rPr lang="en-US" sz="2800" b="1" dirty="0"/>
+              <a:t>;</a:t>
+            </a:r>
+          </a:p>
+          <a:p>
+            <a:r>
+              <a:rPr lang="en-US" sz="2800" b="1" dirty="0" err="1"/>
+              <a:t>myName</a:t>
+            </a:r>
+            <a:r>
+              <a:rPr lang="en-US" sz="2800" b="1" dirty="0"/>
+              <a:t> = “John Doe”;</a:t>
+            </a:r>
+          </a:p>
+        </p:txBody>
+      </p:sp>
+      <p:sp>
+        <p:nvSpPr>
+          <p:cNvPr id="10" name="TextBox 9">
+            <a:extLst>
+              <a:ext uri="{FF2B5EF4-FFF2-40B4-BE49-F238E27FC236}">
+                <a16:creationId xmlns:a16="http://schemas.microsoft.com/office/drawing/2014/main" id="{219770C9-6574-43D3-95DD-A2A10A98B2E2}"/>
+              </a:ext>
+            </a:extLst>
+          </p:cNvPr>
+          <p:cNvSpPr txBox="1"/>
+          <p:nvPr/>
+        </p:nvSpPr>
+        <p:spPr>
+          <a:xfrm>
+            <a:off x="4788242" y="5202959"/>
+            <a:ext cx="2775119" cy="1384995"/>
+          </a:xfrm>
+          <a:prstGeom prst="rect">
+            <a:avLst/>
+          </a:prstGeom>
+          <a:noFill/>
+        </p:spPr>
+        <p:txBody>
+          <a:bodyPr wrap="none" rtlCol="0">
+            <a:spAutoFit/>
+          </a:bodyPr>
+          <a:lstStyle/>
+          <a:p>
+            <a:r>
+              <a:rPr lang="en-US" sz="2800" b="1" dirty="0"/>
+              <a:t>let year = 2020;</a:t>
+            </a:r>
+          </a:p>
+          <a:p>
+            <a:r>
+              <a:rPr lang="en-US" sz="2800" b="1" dirty="0"/>
+              <a:t>year = 2021;</a:t>
+            </a:r>
+          </a:p>
+          <a:p>
+            <a:r>
+              <a:rPr lang="en-US" sz="2800" b="1" dirty="0"/>
+              <a:t>year = 2022;</a:t>
+            </a:r>
+          </a:p>
+        </p:txBody>
+      </p:sp>
+      <p:sp>
+        <p:nvSpPr>
+          <p:cNvPr id="3" name="Rectangle: Rounded Corners 2">
+            <a:extLst>
+              <a:ext uri="{FF2B5EF4-FFF2-40B4-BE49-F238E27FC236}">
+                <a16:creationId xmlns:a16="http://schemas.microsoft.com/office/drawing/2014/main" id="{E13D2088-2E77-4188-B495-474162D0E119}"/>
+              </a:ext>
+            </a:extLst>
+          </p:cNvPr>
+          <p:cNvSpPr/>
+          <p:nvPr/>
+        </p:nvSpPr>
+        <p:spPr>
+          <a:xfrm>
+            <a:off x="207433" y="1480931"/>
+            <a:ext cx="8790616" cy="1409068"/>
+          </a:xfrm>
+          <a:prstGeom prst="roundRect">
+            <a:avLst/>
+          </a:prstGeom>
+          <a:noFill/>
+          <a:ln w="38100"/>
+        </p:spPr>
+        <p:style>
+          <a:lnRef idx="2">
+            <a:schemeClr val="accent1">
+              <a:shade val="50000"/>
+            </a:schemeClr>
+          </a:lnRef>
+          <a:fillRef idx="1">
+            <a:schemeClr val="accent1"/>
+          </a:fillRef>
+          <a:effectRef idx="0">
+            <a:schemeClr val="accent1"/>
+          </a:effectRef>
+          <a:fontRef idx="minor">
+            <a:schemeClr val="lt1"/>
+          </a:fontRef>
+        </p:style>
+        <p:txBody>
+          <a:bodyPr rtlCol="0" anchor="ctr"/>
+          <a:lstStyle/>
+          <a:p>
+            <a:pPr algn="ctr"/>
+            <a:endParaRPr lang="en-US"/>
+          </a:p>
+        </p:txBody>
+      </p:sp>
+      <p:sp>
+        <p:nvSpPr>
+          <p:cNvPr id="23" name="Rectangle: Rounded Corners 22">
+            <a:extLst>
+              <a:ext uri="{FF2B5EF4-FFF2-40B4-BE49-F238E27FC236}">
+                <a16:creationId xmlns:a16="http://schemas.microsoft.com/office/drawing/2014/main" id="{D1C11925-33BB-4B9E-8B30-A8237CB156C2}"/>
+              </a:ext>
+            </a:extLst>
+          </p:cNvPr>
+          <p:cNvSpPr/>
+          <p:nvPr/>
+        </p:nvSpPr>
+        <p:spPr>
+          <a:xfrm>
+            <a:off x="187804" y="3303722"/>
+            <a:ext cx="8790618" cy="1431234"/>
+          </a:xfrm>
+          <a:prstGeom prst="roundRect">
+            <a:avLst/>
+          </a:prstGeom>
+          <a:noFill/>
+          <a:ln w="38100"/>
+        </p:spPr>
+        <p:style>
+          <a:lnRef idx="2">
+            <a:schemeClr val="accent1">
+              <a:shade val="50000"/>
+            </a:schemeClr>
+          </a:lnRef>
+          <a:fillRef idx="1">
+            <a:schemeClr val="accent1"/>
+          </a:fillRef>
+          <a:effectRef idx="0">
+            <a:schemeClr val="accent1"/>
+          </a:effectRef>
+          <a:fontRef idx="minor">
+            <a:schemeClr val="lt1"/>
+          </a:fontRef>
+        </p:style>
+        <p:txBody>
+          <a:bodyPr rtlCol="0" anchor="ctr"/>
+          <a:lstStyle/>
+          <a:p>
+            <a:pPr algn="ctr"/>
+            <a:endParaRPr lang="en-US"/>
+          </a:p>
+        </p:txBody>
+      </p:sp>
+      <p:sp>
+        <p:nvSpPr>
+          <p:cNvPr id="24" name="Rectangle: Rounded Corners 23">
+            <a:extLst>
+              <a:ext uri="{FF2B5EF4-FFF2-40B4-BE49-F238E27FC236}">
+                <a16:creationId xmlns:a16="http://schemas.microsoft.com/office/drawing/2014/main" id="{A2B18FDA-070E-47C9-AFDF-614C255A85C0}"/>
+              </a:ext>
+            </a:extLst>
+          </p:cNvPr>
+          <p:cNvSpPr/>
+          <p:nvPr/>
+        </p:nvSpPr>
+        <p:spPr>
+          <a:xfrm>
+            <a:off x="176691" y="5133654"/>
+            <a:ext cx="8790618" cy="1431234"/>
+          </a:xfrm>
+          <a:prstGeom prst="roundRect">
+            <a:avLst/>
+          </a:prstGeom>
+          <a:noFill/>
+          <a:ln w="38100"/>
+        </p:spPr>
+        <p:style>
+          <a:lnRef idx="2">
+            <a:schemeClr val="accent1">
+              <a:shade val="50000"/>
+            </a:schemeClr>
+          </a:lnRef>
+          <a:fillRef idx="1">
+            <a:schemeClr val="accent1"/>
+          </a:fillRef>
+          <a:effectRef idx="0">
+            <a:schemeClr val="accent1"/>
+          </a:effectRef>
+          <a:fontRef idx="minor">
+            <a:schemeClr val="lt1"/>
+          </a:fontRef>
+        </p:style>
+        <p:txBody>
+          <a:bodyPr rtlCol="0" anchor="ctr"/>
+          <a:lstStyle/>
+          <a:p>
+            <a:pPr algn="ctr"/>
+            <a:endParaRPr lang="en-US"/>
+          </a:p>
+        </p:txBody>
+      </p:sp>
+    </p:spTree>
+    <p:extLst>
+      <p:ext uri="{BB962C8B-B14F-4D97-AF65-F5344CB8AC3E}">
+        <p14:creationId xmlns:p14="http://schemas.microsoft.com/office/powerpoint/2010/main" val="455569934"/>
+      </p:ext>
+    </p:extLst>
+  </p:cSld>
+  <p:clrMapOvr>
+    <a:masterClrMapping/>
+  </p:clrMapOvr>
+</p:sld>
+</file>
+
+<file path=ppt/slides/slide12.xml><?xml version="1.0" encoding="utf-8"?>
+<p:sld xmlns:a="http://schemas.openxmlformats.org/drawingml/2006/main" xmlns:r="http://schemas.openxmlformats.org/officeDocument/2006/relationships" xmlns:p="http://schemas.openxmlformats.org/presentationml/2006/main">
+  <p:cSld>
+    <p:spTree>
+      <p:nvGrpSpPr>
+        <p:cNvPr id="1" name=""/>
+        <p:cNvGrpSpPr/>
+        <p:nvPr/>
+      </p:nvGrpSpPr>
+      <p:grpSpPr>
+        <a:xfrm>
+          <a:off x="0" y="0"/>
+          <a:ext cx="0" cy="0"/>
+          <a:chOff x="0" y="0"/>
+          <a:chExt cx="0" cy="0"/>
+        </a:xfrm>
+      </p:grpSpPr>
+      <p:sp>
+        <p:nvSpPr>
+          <p:cNvPr id="2" name="Title 1">
+            <a:extLst>
+              <a:ext uri="{FF2B5EF4-FFF2-40B4-BE49-F238E27FC236}">
                 <a16:creationId xmlns:a16="http://schemas.microsoft.com/office/drawing/2014/main" id="{5CA5F156-8558-4EA2-AF0B-E72FCD79757A}"/>
               </a:ext>
             </a:extLst>
@@ -39229,7 +40340,7 @@
             <a:fld id="{F6728BC2-ACA3-447C-A909-F3F49211C066}" type="slidenum">
               <a:rPr lang="en-US" smtClean="0"/>
               <a:pPr/>
-              <a:t>9</a:t>
+              <a:t>11</a:t>
             </a:fld>
             <a:endParaRPr lang="en-US" dirty="0"/>
           </a:p>
@@ -39305,7 +40416,7 @@
 </p:sld>
 </file>
 
-<file path=ppt/slides/slide11.xml><?xml version="1.0" encoding="utf-8"?>
+<file path=ppt/slides/slide13.xml><?xml version="1.0" encoding="utf-8"?>
 <p:sld xmlns:a="http://schemas.openxmlformats.org/drawingml/2006/main" xmlns:r="http://schemas.openxmlformats.org/officeDocument/2006/relationships" xmlns:p="http://schemas.openxmlformats.org/presentationml/2006/main">
   <p:cSld>
     <p:spTree>
@@ -39474,7 +40585,7 @@
             <a:fld id="{F6728BC2-ACA3-447C-A909-F3F49211C066}" type="slidenum">
               <a:rPr lang="en-US" smtClean="0"/>
               <a:pPr/>
-              <a:t>10</a:t>
+              <a:t>12</a:t>
             </a:fld>
             <a:endParaRPr lang="en-US" dirty="0"/>
           </a:p>
@@ -39493,7 +40604,7 @@
 </p:sld>
 </file>
 
-<file path=ppt/slides/slide12.xml><?xml version="1.0" encoding="utf-8"?>
+<file path=ppt/slides/slide14.xml><?xml version="1.0" encoding="utf-8"?>
 <p:sld xmlns:a="http://schemas.openxmlformats.org/drawingml/2006/main" xmlns:r="http://schemas.openxmlformats.org/officeDocument/2006/relationships" xmlns:p="http://schemas.openxmlformats.org/presentationml/2006/main">
   <p:cSld>
     <p:spTree>
@@ -39738,7 +40849,7 @@
             <a:fld id="{F6728BC2-ACA3-447C-A909-F3F49211C066}" type="slidenum">
               <a:rPr lang="en-US" smtClean="0"/>
               <a:pPr/>
-              <a:t>11</a:t>
+              <a:t>13</a:t>
             </a:fld>
             <a:endParaRPr lang="en-US" dirty="0"/>
           </a:p>
@@ -39748,279 +40859,6 @@
     <p:extLst>
       <p:ext uri="{BB962C8B-B14F-4D97-AF65-F5344CB8AC3E}">
         <p14:creationId xmlns:p14="http://schemas.microsoft.com/office/powerpoint/2010/main" val="384837883"/>
-      </p:ext>
-    </p:extLst>
-  </p:cSld>
-  <p:clrMapOvr>
-    <a:masterClrMapping/>
-  </p:clrMapOvr>
-</p:sld>
-</file>
-
-<file path=ppt/slides/slide13.xml><?xml version="1.0" encoding="utf-8"?>
-<p:sld xmlns:a="http://schemas.openxmlformats.org/drawingml/2006/main" xmlns:r="http://schemas.openxmlformats.org/officeDocument/2006/relationships" xmlns:p="http://schemas.openxmlformats.org/presentationml/2006/main">
-  <p:cSld>
-    <p:spTree>
-      <p:nvGrpSpPr>
-        <p:cNvPr id="1" name=""/>
-        <p:cNvGrpSpPr/>
-        <p:nvPr/>
-      </p:nvGrpSpPr>
-      <p:grpSpPr>
-        <a:xfrm>
-          <a:off x="0" y="0"/>
-          <a:ext cx="0" cy="0"/>
-          <a:chOff x="0" y="0"/>
-          <a:chExt cx="0" cy="0"/>
-        </a:xfrm>
-      </p:grpSpPr>
-      <p:sp>
-        <p:nvSpPr>
-          <p:cNvPr id="2" name="Slide Number Placeholder 1">
-            <a:extLst>
-              <a:ext uri="{FF2B5EF4-FFF2-40B4-BE49-F238E27FC236}">
-                <a16:creationId xmlns:a16="http://schemas.microsoft.com/office/drawing/2014/main" id="{E0124361-4933-42E0-953F-F76C71C7D151}"/>
-              </a:ext>
-            </a:extLst>
-          </p:cNvPr>
-          <p:cNvSpPr>
-            <a:spLocks noGrp="1"/>
-          </p:cNvSpPr>
-          <p:nvPr>
-            <p:ph type="sldNum" sz="quarter" idx="12"/>
-          </p:nvPr>
-        </p:nvSpPr>
-        <p:spPr/>
-        <p:txBody>
-          <a:bodyPr/>
-          <a:lstStyle/>
-          <a:p>
-            <a:fld id="{F6728BC2-ACA3-447C-A909-F3F49211C066}" type="slidenum">
-              <a:rPr lang="en-US" smtClean="0"/>
-              <a:pPr/>
-              <a:t>12</a:t>
-            </a:fld>
-            <a:endParaRPr lang="en-US" dirty="0"/>
-          </a:p>
-        </p:txBody>
-      </p:sp>
-      <p:sp>
-        <p:nvSpPr>
-          <p:cNvPr id="3" name="Content Placeholder 2">
-            <a:extLst>
-              <a:ext uri="{FF2B5EF4-FFF2-40B4-BE49-F238E27FC236}">
-                <a16:creationId xmlns:a16="http://schemas.microsoft.com/office/drawing/2014/main" id="{28FC537F-5083-426D-8D61-966126BC8D45}"/>
-              </a:ext>
-            </a:extLst>
-          </p:cNvPr>
-          <p:cNvSpPr>
-            <a:spLocks noGrp="1"/>
-          </p:cNvSpPr>
-          <p:nvPr>
-            <p:ph sz="quarter" idx="13"/>
-          </p:nvPr>
-        </p:nvSpPr>
-        <p:spPr>
-          <a:xfrm>
-            <a:off x="158750" y="1769166"/>
-            <a:ext cx="8826500" cy="2308898"/>
-          </a:xfrm>
-        </p:spPr>
-        <p:txBody>
-          <a:bodyPr>
-            <a:noAutofit/>
-          </a:bodyPr>
-          <a:lstStyle/>
-          <a:p>
-            <a:pPr algn="ctr"/>
-            <a:r>
-              <a:rPr lang="en-US" sz="7200" dirty="0"/>
-              <a:t>JavaScript and the Browser</a:t>
-            </a:r>
-          </a:p>
-        </p:txBody>
-      </p:sp>
-    </p:spTree>
-    <p:extLst>
-      <p:ext uri="{BB962C8B-B14F-4D97-AF65-F5344CB8AC3E}">
-        <p14:creationId xmlns:p14="http://schemas.microsoft.com/office/powerpoint/2010/main" val="3739944098"/>
-      </p:ext>
-    </p:extLst>
-  </p:cSld>
-  <p:clrMapOvr>
-    <a:masterClrMapping/>
-  </p:clrMapOvr>
-</p:sld>
-</file>
-
-<file path=ppt/slides/slide14.xml><?xml version="1.0" encoding="utf-8"?>
-<p:sld xmlns:a="http://schemas.openxmlformats.org/drawingml/2006/main" xmlns:r="http://schemas.openxmlformats.org/officeDocument/2006/relationships" xmlns:p="http://schemas.openxmlformats.org/presentationml/2006/main">
-  <p:cSld>
-    <p:spTree>
-      <p:nvGrpSpPr>
-        <p:cNvPr id="1" name=""/>
-        <p:cNvGrpSpPr/>
-        <p:nvPr/>
-      </p:nvGrpSpPr>
-      <p:grpSpPr>
-        <a:xfrm>
-          <a:off x="0" y="0"/>
-          <a:ext cx="0" cy="0"/>
-          <a:chOff x="0" y="0"/>
-          <a:chExt cx="0" cy="0"/>
-        </a:xfrm>
-      </p:grpSpPr>
-      <p:sp>
-        <p:nvSpPr>
-          <p:cNvPr id="2" name="Title 1">
-            <a:extLst>
-              <a:ext uri="{FF2B5EF4-FFF2-40B4-BE49-F238E27FC236}">
-                <a16:creationId xmlns:a16="http://schemas.microsoft.com/office/drawing/2014/main" id="{2A26D120-A149-44E7-B492-990C861D5470}"/>
-              </a:ext>
-            </a:extLst>
-          </p:cNvPr>
-          <p:cNvSpPr>
-            <a:spLocks noGrp="1"/>
-          </p:cNvSpPr>
-          <p:nvPr>
-            <p:ph type="title"/>
-          </p:nvPr>
-        </p:nvSpPr>
-        <p:spPr/>
-        <p:txBody>
-          <a:bodyPr/>
-          <a:lstStyle/>
-          <a:p>
-            <a:r>
-              <a:rPr lang="en-US" dirty="0"/>
-              <a:t>Developer Tools</a:t>
-            </a:r>
-          </a:p>
-        </p:txBody>
-      </p:sp>
-      <p:sp>
-        <p:nvSpPr>
-          <p:cNvPr id="3" name="Content Placeholder 2">
-            <a:extLst>
-              <a:ext uri="{FF2B5EF4-FFF2-40B4-BE49-F238E27FC236}">
-                <a16:creationId xmlns:a16="http://schemas.microsoft.com/office/drawing/2014/main" id="{C431139D-E432-48EC-9A2B-69D4C4D3886E}"/>
-              </a:ext>
-            </a:extLst>
-          </p:cNvPr>
-          <p:cNvSpPr>
-            <a:spLocks noGrp="1"/>
-          </p:cNvSpPr>
-          <p:nvPr>
-            <p:ph idx="1"/>
-          </p:nvPr>
-        </p:nvSpPr>
-        <p:spPr/>
-        <p:txBody>
-          <a:bodyPr>
-            <a:normAutofit fontScale="92500" lnSpcReduction="20000"/>
-          </a:bodyPr>
-          <a:lstStyle/>
-          <a:p>
-            <a:endParaRPr lang="en-US" dirty="0"/>
-          </a:p>
-          <a:p>
-            <a:r>
-              <a:rPr lang="en-US" dirty="0"/>
-              <a:t>The Developer Console is an </a:t>
-            </a:r>
-            <a:r>
-              <a:rPr lang="en-US" b="1" dirty="0"/>
-              <a:t>IDE, </a:t>
-            </a:r>
-            <a:r>
-              <a:rPr lang="en-US" dirty="0"/>
-              <a:t>integrated development environment, that is integrated with your web browser. </a:t>
-            </a:r>
-          </a:p>
-          <a:p>
-            <a:r>
-              <a:rPr lang="en-US" b="1" dirty="0"/>
-              <a:t>IDE: </a:t>
-            </a:r>
-            <a:r>
-              <a:rPr lang="en-US" dirty="0"/>
-              <a:t>program that provides more than text editing to help with developing a program</a:t>
-            </a:r>
-          </a:p>
-          <a:p>
-            <a:pPr lvl="1"/>
-            <a:r>
-              <a:rPr lang="en-US" dirty="0"/>
-              <a:t>Debugging, build tools, </a:t>
-            </a:r>
-            <a:r>
-              <a:rPr lang="en-US" dirty="0" err="1"/>
-              <a:t>etc</a:t>
-            </a:r>
-            <a:endParaRPr lang="en-US" dirty="0"/>
-          </a:p>
-          <a:p>
-            <a:r>
-              <a:rPr lang="en-US" dirty="0"/>
-              <a:t>It is used to create, debug and test web applications.</a:t>
-            </a:r>
-          </a:p>
-          <a:p>
-            <a:r>
-              <a:rPr lang="en-US" dirty="0"/>
-              <a:t>Access the developer console:</a:t>
-            </a:r>
-          </a:p>
-          <a:p>
-            <a:pPr lvl="1"/>
-            <a:r>
-              <a:rPr lang="en-US" dirty="0"/>
-              <a:t>By pressing the F12 key (on most web browsers)</a:t>
-            </a:r>
-          </a:p>
-          <a:p>
-            <a:pPr lvl="1"/>
-            <a:r>
-              <a:rPr lang="en-US" dirty="0"/>
-              <a:t>Or right-click on the webpage and select ‘inspect’ or ‘inspect element’ (on most web browsers).</a:t>
-            </a:r>
-          </a:p>
-        </p:txBody>
-      </p:sp>
-      <p:sp>
-        <p:nvSpPr>
-          <p:cNvPr id="4" name="Slide Number Placeholder 3">
-            <a:extLst>
-              <a:ext uri="{FF2B5EF4-FFF2-40B4-BE49-F238E27FC236}">
-                <a16:creationId xmlns:a16="http://schemas.microsoft.com/office/drawing/2014/main" id="{878383AD-9114-4320-9862-28F91A259B1F}"/>
-              </a:ext>
-            </a:extLst>
-          </p:cNvPr>
-          <p:cNvSpPr>
-            <a:spLocks noGrp="1"/>
-          </p:cNvSpPr>
-          <p:nvPr>
-            <p:ph type="sldNum" sz="quarter" idx="12"/>
-          </p:nvPr>
-        </p:nvSpPr>
-        <p:spPr/>
-        <p:txBody>
-          <a:bodyPr/>
-          <a:lstStyle/>
-          <a:p>
-            <a:fld id="{F6728BC2-ACA3-447C-A909-F3F49211C066}" type="slidenum">
-              <a:rPr lang="en-US" smtClean="0"/>
-              <a:pPr/>
-              <a:t>13</a:t>
-            </a:fld>
-            <a:endParaRPr lang="en-US" dirty="0"/>
-          </a:p>
-        </p:txBody>
-      </p:sp>
-    </p:spTree>
-    <p:extLst>
-      <p:ext uri="{BB962C8B-B14F-4D97-AF65-F5344CB8AC3E}">
-        <p14:creationId xmlns:p14="http://schemas.microsoft.com/office/powerpoint/2010/main" val="3610168157"/>
       </p:ext>
     </p:extLst>
   </p:cSld>
@@ -42631,13 +43469,13 @@
           <a:p>
             <a:r>
               <a:rPr lang="en-US" dirty="0"/>
-              <a:t>Basic Building Blocks of Code</a:t>
+              <a:t>JavaScript and the Browser</a:t>
             </a:r>
           </a:p>
           <a:p>
             <a:r>
               <a:rPr lang="en-US" dirty="0"/>
-              <a:t>JavaScript and the Browser</a:t>
+              <a:t>Basic Building Blocks of Code</a:t>
             </a:r>
           </a:p>
           <a:p>
@@ -43809,6 +44647,279 @@
             <a:pPr algn="ctr"/>
             <a:r>
               <a:rPr lang="en-US" sz="7200" dirty="0"/>
+              <a:t>JavaScript and the Browser</a:t>
+            </a:r>
+          </a:p>
+        </p:txBody>
+      </p:sp>
+    </p:spTree>
+    <p:extLst>
+      <p:ext uri="{BB962C8B-B14F-4D97-AF65-F5344CB8AC3E}">
+        <p14:creationId xmlns:p14="http://schemas.microsoft.com/office/powerpoint/2010/main" val="3739944098"/>
+      </p:ext>
+    </p:extLst>
+  </p:cSld>
+  <p:clrMapOvr>
+    <a:masterClrMapping/>
+  </p:clrMapOvr>
+</p:sld>
+</file>
+
+<file path=ppt/slides/slide6.xml><?xml version="1.0" encoding="utf-8"?>
+<p:sld xmlns:a="http://schemas.openxmlformats.org/drawingml/2006/main" xmlns:r="http://schemas.openxmlformats.org/officeDocument/2006/relationships" xmlns:p="http://schemas.openxmlformats.org/presentationml/2006/main">
+  <p:cSld>
+    <p:spTree>
+      <p:nvGrpSpPr>
+        <p:cNvPr id="1" name=""/>
+        <p:cNvGrpSpPr/>
+        <p:nvPr/>
+      </p:nvGrpSpPr>
+      <p:grpSpPr>
+        <a:xfrm>
+          <a:off x="0" y="0"/>
+          <a:ext cx="0" cy="0"/>
+          <a:chOff x="0" y="0"/>
+          <a:chExt cx="0" cy="0"/>
+        </a:xfrm>
+      </p:grpSpPr>
+      <p:sp>
+        <p:nvSpPr>
+          <p:cNvPr id="2" name="Title 1">
+            <a:extLst>
+              <a:ext uri="{FF2B5EF4-FFF2-40B4-BE49-F238E27FC236}">
+                <a16:creationId xmlns:a16="http://schemas.microsoft.com/office/drawing/2014/main" id="{2A26D120-A149-44E7-B492-990C861D5470}"/>
+              </a:ext>
+            </a:extLst>
+          </p:cNvPr>
+          <p:cNvSpPr>
+            <a:spLocks noGrp="1"/>
+          </p:cNvSpPr>
+          <p:nvPr>
+            <p:ph type="title"/>
+          </p:nvPr>
+        </p:nvSpPr>
+        <p:spPr/>
+        <p:txBody>
+          <a:bodyPr/>
+          <a:lstStyle/>
+          <a:p>
+            <a:r>
+              <a:rPr lang="en-US" dirty="0"/>
+              <a:t>Developer Tools</a:t>
+            </a:r>
+          </a:p>
+        </p:txBody>
+      </p:sp>
+      <p:sp>
+        <p:nvSpPr>
+          <p:cNvPr id="3" name="Content Placeholder 2">
+            <a:extLst>
+              <a:ext uri="{FF2B5EF4-FFF2-40B4-BE49-F238E27FC236}">
+                <a16:creationId xmlns:a16="http://schemas.microsoft.com/office/drawing/2014/main" id="{C431139D-E432-48EC-9A2B-69D4C4D3886E}"/>
+              </a:ext>
+            </a:extLst>
+          </p:cNvPr>
+          <p:cNvSpPr>
+            <a:spLocks noGrp="1"/>
+          </p:cNvSpPr>
+          <p:nvPr>
+            <p:ph idx="1"/>
+          </p:nvPr>
+        </p:nvSpPr>
+        <p:spPr/>
+        <p:txBody>
+          <a:bodyPr>
+            <a:normAutofit fontScale="92500" lnSpcReduction="20000"/>
+          </a:bodyPr>
+          <a:lstStyle/>
+          <a:p>
+            <a:endParaRPr lang="en-US" dirty="0"/>
+          </a:p>
+          <a:p>
+            <a:r>
+              <a:rPr lang="en-US" dirty="0"/>
+              <a:t>The Developer Console is an </a:t>
+            </a:r>
+            <a:r>
+              <a:rPr lang="en-US" b="1" dirty="0"/>
+              <a:t>IDE, </a:t>
+            </a:r>
+            <a:r>
+              <a:rPr lang="en-US" dirty="0"/>
+              <a:t>integrated development environment, that is integrated with your web browser. </a:t>
+            </a:r>
+          </a:p>
+          <a:p>
+            <a:r>
+              <a:rPr lang="en-US" b="1" dirty="0"/>
+              <a:t>IDE: </a:t>
+            </a:r>
+            <a:r>
+              <a:rPr lang="en-US" dirty="0"/>
+              <a:t>program that provides more than text editing to help with developing a program</a:t>
+            </a:r>
+          </a:p>
+          <a:p>
+            <a:pPr lvl="1"/>
+            <a:r>
+              <a:rPr lang="en-US" dirty="0"/>
+              <a:t>Debugging, build tools, </a:t>
+            </a:r>
+            <a:r>
+              <a:rPr lang="en-US" dirty="0" err="1"/>
+              <a:t>etc</a:t>
+            </a:r>
+            <a:endParaRPr lang="en-US" dirty="0"/>
+          </a:p>
+          <a:p>
+            <a:r>
+              <a:rPr lang="en-US" dirty="0"/>
+              <a:t>It is used to create, debug and test web applications.</a:t>
+            </a:r>
+          </a:p>
+          <a:p>
+            <a:r>
+              <a:rPr lang="en-US" dirty="0"/>
+              <a:t>Access the developer console:</a:t>
+            </a:r>
+          </a:p>
+          <a:p>
+            <a:pPr lvl="1"/>
+            <a:r>
+              <a:rPr lang="en-US" dirty="0"/>
+              <a:t>By pressing the F12 key (on most web browsers)</a:t>
+            </a:r>
+          </a:p>
+          <a:p>
+            <a:pPr lvl="1"/>
+            <a:r>
+              <a:rPr lang="en-US" dirty="0"/>
+              <a:t>Or right-click on the webpage and select ‘inspect’ or ‘inspect element’ (on most web browsers).</a:t>
+            </a:r>
+          </a:p>
+        </p:txBody>
+      </p:sp>
+      <p:sp>
+        <p:nvSpPr>
+          <p:cNvPr id="4" name="Slide Number Placeholder 3">
+            <a:extLst>
+              <a:ext uri="{FF2B5EF4-FFF2-40B4-BE49-F238E27FC236}">
+                <a16:creationId xmlns:a16="http://schemas.microsoft.com/office/drawing/2014/main" id="{878383AD-9114-4320-9862-28F91A259B1F}"/>
+              </a:ext>
+            </a:extLst>
+          </p:cNvPr>
+          <p:cNvSpPr>
+            <a:spLocks noGrp="1"/>
+          </p:cNvSpPr>
+          <p:nvPr>
+            <p:ph type="sldNum" sz="quarter" idx="12"/>
+          </p:nvPr>
+        </p:nvSpPr>
+        <p:spPr/>
+        <p:txBody>
+          <a:bodyPr/>
+          <a:lstStyle/>
+          <a:p>
+            <a:fld id="{F6728BC2-ACA3-447C-A909-F3F49211C066}" type="slidenum">
+              <a:rPr lang="en-US" smtClean="0"/>
+              <a:pPr/>
+              <a:t>5</a:t>
+            </a:fld>
+            <a:endParaRPr lang="en-US" dirty="0"/>
+          </a:p>
+        </p:txBody>
+      </p:sp>
+    </p:spTree>
+    <p:extLst>
+      <p:ext uri="{BB962C8B-B14F-4D97-AF65-F5344CB8AC3E}">
+        <p14:creationId xmlns:p14="http://schemas.microsoft.com/office/powerpoint/2010/main" val="3610168157"/>
+      </p:ext>
+    </p:extLst>
+  </p:cSld>
+  <p:clrMapOvr>
+    <a:masterClrMapping/>
+  </p:clrMapOvr>
+</p:sld>
+</file>
+
+<file path=ppt/slides/slide7.xml><?xml version="1.0" encoding="utf-8"?>
+<p:sld xmlns:a="http://schemas.openxmlformats.org/drawingml/2006/main" xmlns:r="http://schemas.openxmlformats.org/officeDocument/2006/relationships" xmlns:p="http://schemas.openxmlformats.org/presentationml/2006/main">
+  <p:cSld>
+    <p:spTree>
+      <p:nvGrpSpPr>
+        <p:cNvPr id="1" name=""/>
+        <p:cNvGrpSpPr/>
+        <p:nvPr/>
+      </p:nvGrpSpPr>
+      <p:grpSpPr>
+        <a:xfrm>
+          <a:off x="0" y="0"/>
+          <a:ext cx="0" cy="0"/>
+          <a:chOff x="0" y="0"/>
+          <a:chExt cx="0" cy="0"/>
+        </a:xfrm>
+      </p:grpSpPr>
+      <p:sp>
+        <p:nvSpPr>
+          <p:cNvPr id="2" name="Slide Number Placeholder 1">
+            <a:extLst>
+              <a:ext uri="{FF2B5EF4-FFF2-40B4-BE49-F238E27FC236}">
+                <a16:creationId xmlns:a16="http://schemas.microsoft.com/office/drawing/2014/main" id="{E0124361-4933-42E0-953F-F76C71C7D151}"/>
+              </a:ext>
+            </a:extLst>
+          </p:cNvPr>
+          <p:cNvSpPr>
+            <a:spLocks noGrp="1"/>
+          </p:cNvSpPr>
+          <p:nvPr>
+            <p:ph type="sldNum" sz="quarter" idx="12"/>
+          </p:nvPr>
+        </p:nvSpPr>
+        <p:spPr/>
+        <p:txBody>
+          <a:bodyPr/>
+          <a:lstStyle/>
+          <a:p>
+            <a:fld id="{F6728BC2-ACA3-447C-A909-F3F49211C066}" type="slidenum">
+              <a:rPr lang="en-US" smtClean="0"/>
+              <a:pPr/>
+              <a:t>6</a:t>
+            </a:fld>
+            <a:endParaRPr lang="en-US" dirty="0"/>
+          </a:p>
+        </p:txBody>
+      </p:sp>
+      <p:sp>
+        <p:nvSpPr>
+          <p:cNvPr id="3" name="Content Placeholder 2">
+            <a:extLst>
+              <a:ext uri="{FF2B5EF4-FFF2-40B4-BE49-F238E27FC236}">
+                <a16:creationId xmlns:a16="http://schemas.microsoft.com/office/drawing/2014/main" id="{28FC537F-5083-426D-8D61-966126BC8D45}"/>
+              </a:ext>
+            </a:extLst>
+          </p:cNvPr>
+          <p:cNvSpPr>
+            <a:spLocks noGrp="1"/>
+          </p:cNvSpPr>
+          <p:nvPr>
+            <p:ph sz="quarter" idx="13"/>
+          </p:nvPr>
+        </p:nvSpPr>
+        <p:spPr>
+          <a:xfrm>
+            <a:off x="158750" y="1769166"/>
+            <a:ext cx="8826500" cy="2308898"/>
+          </a:xfrm>
+        </p:spPr>
+        <p:txBody>
+          <a:bodyPr>
+            <a:noAutofit/>
+          </a:bodyPr>
+          <a:lstStyle/>
+          <a:p>
+            <a:pPr algn="ctr"/>
+            <a:r>
+              <a:rPr lang="en-US" sz="7200" dirty="0"/>
               <a:t>Basic Building Blocks of Code</a:t>
             </a:r>
           </a:p>
@@ -43827,7 +44938,7 @@
 </p:sld>
 </file>
 
-<file path=ppt/slides/slide6.xml><?xml version="1.0" encoding="utf-8"?>
+<file path=ppt/slides/slide8.xml><?xml version="1.0" encoding="utf-8"?>
 <p:sld xmlns:a="http://schemas.openxmlformats.org/drawingml/2006/main" xmlns:r="http://schemas.openxmlformats.org/officeDocument/2006/relationships" xmlns:p="http://schemas.openxmlformats.org/presentationml/2006/main">
   <p:cSld>
     <p:spTree>
@@ -43974,7 +45085,7 @@
             <a:fld id="{F6728BC2-ACA3-447C-A909-F3F49211C066}" type="slidenum">
               <a:rPr lang="en-US" smtClean="0"/>
               <a:pPr/>
-              <a:t>5</a:t>
+              <a:t>7</a:t>
             </a:fld>
             <a:endParaRPr lang="en-US" dirty="0"/>
           </a:p>
@@ -43993,7 +45104,7 @@
 </p:sld>
 </file>
 
-<file path=ppt/slides/slide7.xml><?xml version="1.0" encoding="utf-8"?>
+<file path=ppt/slides/slide9.xml><?xml version="1.0" encoding="utf-8"?>
 <p:sld xmlns:a="http://schemas.openxmlformats.org/drawingml/2006/main" xmlns:r="http://schemas.openxmlformats.org/officeDocument/2006/relationships" xmlns:p="http://schemas.openxmlformats.org/presentationml/2006/main">
   <p:cSld>
     <p:spTree>
@@ -44062,7 +45173,7 @@
             <a:fld id="{F6728BC2-ACA3-447C-A909-F3F49211C066}" type="slidenum">
               <a:rPr lang="en-US" smtClean="0"/>
               <a:pPr/>
-              <a:t>6</a:t>
+              <a:t>8</a:t>
             </a:fld>
             <a:endParaRPr lang="en-US" dirty="0"/>
           </a:p>
@@ -44467,1111 +45578,6 @@
     <p:extLst>
       <p:ext uri="{BB962C8B-B14F-4D97-AF65-F5344CB8AC3E}">
         <p14:creationId xmlns:p14="http://schemas.microsoft.com/office/powerpoint/2010/main" val="608514704"/>
-      </p:ext>
-    </p:extLst>
-  </p:cSld>
-  <p:clrMapOvr>
-    <a:masterClrMapping/>
-  </p:clrMapOvr>
-</p:sld>
-</file>
-
-<file path=ppt/slides/slide8.xml><?xml version="1.0" encoding="utf-8"?>
-<p:sld xmlns:a="http://schemas.openxmlformats.org/drawingml/2006/main" xmlns:r="http://schemas.openxmlformats.org/officeDocument/2006/relationships" xmlns:p="http://schemas.openxmlformats.org/presentationml/2006/main">
-  <p:cSld>
-    <p:spTree>
-      <p:nvGrpSpPr>
-        <p:cNvPr id="1" name=""/>
-        <p:cNvGrpSpPr/>
-        <p:nvPr/>
-      </p:nvGrpSpPr>
-      <p:grpSpPr>
-        <a:xfrm>
-          <a:off x="0" y="0"/>
-          <a:ext cx="0" cy="0"/>
-          <a:chOff x="0" y="0"/>
-          <a:chExt cx="0" cy="0"/>
-        </a:xfrm>
-      </p:grpSpPr>
-      <p:sp>
-        <p:nvSpPr>
-          <p:cNvPr id="2" name="Title 1">
-            <a:extLst>
-              <a:ext uri="{FF2B5EF4-FFF2-40B4-BE49-F238E27FC236}">
-                <a16:creationId xmlns:a16="http://schemas.microsoft.com/office/drawing/2014/main" id="{6614579F-5B60-4A35-B5E6-51125F7380E4}"/>
-              </a:ext>
-            </a:extLst>
-          </p:cNvPr>
-          <p:cNvSpPr>
-            <a:spLocks noGrp="1"/>
-          </p:cNvSpPr>
-          <p:nvPr>
-            <p:ph type="title"/>
-          </p:nvPr>
-        </p:nvSpPr>
-        <p:spPr/>
-        <p:txBody>
-          <a:bodyPr/>
-          <a:lstStyle/>
-          <a:p>
-            <a:r>
-              <a:rPr lang="en-US" dirty="0"/>
-              <a:t>Using Variables</a:t>
-            </a:r>
-          </a:p>
-        </p:txBody>
-      </p:sp>
-      <p:sp>
-        <p:nvSpPr>
-          <p:cNvPr id="3" name="Content Placeholder 2">
-            <a:extLst>
-              <a:ext uri="{FF2B5EF4-FFF2-40B4-BE49-F238E27FC236}">
-                <a16:creationId xmlns:a16="http://schemas.microsoft.com/office/drawing/2014/main" id="{3806DEF6-3785-4BAC-9C3B-BDFAE1DA8C03}"/>
-              </a:ext>
-            </a:extLst>
-          </p:cNvPr>
-          <p:cNvSpPr>
-            <a:spLocks noGrp="1"/>
-          </p:cNvSpPr>
-          <p:nvPr>
-            <p:ph idx="1"/>
-          </p:nvPr>
-        </p:nvSpPr>
-        <p:spPr>
-          <a:xfrm>
-            <a:off x="380010" y="1481446"/>
-            <a:ext cx="8383980" cy="5098258"/>
-          </a:xfrm>
-        </p:spPr>
-        <p:txBody>
-          <a:bodyPr>
-            <a:normAutofit/>
-          </a:bodyPr>
-          <a:lstStyle/>
-          <a:p>
-            <a:r>
-              <a:rPr lang="en-US" dirty="0"/>
-              <a:t>Variables can hold different </a:t>
-            </a:r>
-            <a:r>
-              <a:rPr lang="en-US" i="1" dirty="0"/>
-              <a:t>types</a:t>
-            </a:r>
-            <a:r>
-              <a:rPr lang="en-US" dirty="0"/>
-              <a:t> of data.</a:t>
-            </a:r>
-          </a:p>
-          <a:p>
-            <a:pPr lvl="1"/>
-            <a:r>
-              <a:rPr lang="en-US" dirty="0"/>
-              <a:t>Numbers, Strings (of characters), true/false, etc.</a:t>
-            </a:r>
-          </a:p>
-          <a:p>
-            <a:r>
-              <a:rPr lang="en-US" dirty="0"/>
-              <a:t>You can assign a variable data to hold by </a:t>
-            </a:r>
-            <a:r>
-              <a:rPr lang="en-US" b="1" dirty="0"/>
-              <a:t>initialization or re-assignment.</a:t>
-            </a:r>
-            <a:endParaRPr lang="en-US" dirty="0"/>
-          </a:p>
-          <a:p>
-            <a:pPr lvl="1"/>
-            <a:r>
-              <a:rPr lang="en-US" b="1" dirty="0"/>
-              <a:t>Initialization: </a:t>
-            </a:r>
-            <a:r>
-              <a:rPr lang="en-US" dirty="0"/>
-              <a:t>giving a variable an initial value</a:t>
-            </a:r>
-          </a:p>
-          <a:p>
-            <a:pPr lvl="1"/>
-            <a:r>
-              <a:rPr lang="en-US" b="1" dirty="0"/>
-              <a:t>Re-assignment: </a:t>
-            </a:r>
-            <a:r>
-              <a:rPr lang="en-US" dirty="0"/>
-              <a:t>giving a variable a new, different value than what it previously had</a:t>
-            </a:r>
-          </a:p>
-          <a:p>
-            <a:endParaRPr lang="en-US" dirty="0"/>
-          </a:p>
-        </p:txBody>
-      </p:sp>
-      <p:sp>
-        <p:nvSpPr>
-          <p:cNvPr id="4" name="Slide Number Placeholder 3">
-            <a:extLst>
-              <a:ext uri="{FF2B5EF4-FFF2-40B4-BE49-F238E27FC236}">
-                <a16:creationId xmlns:a16="http://schemas.microsoft.com/office/drawing/2014/main" id="{45624EE7-452F-48E2-B54D-9D81B188F225}"/>
-              </a:ext>
-            </a:extLst>
-          </p:cNvPr>
-          <p:cNvSpPr>
-            <a:spLocks noGrp="1"/>
-          </p:cNvSpPr>
-          <p:nvPr>
-            <p:ph type="sldNum" sz="quarter" idx="12"/>
-          </p:nvPr>
-        </p:nvSpPr>
-        <p:spPr/>
-        <p:txBody>
-          <a:bodyPr/>
-          <a:lstStyle/>
-          <a:p>
-            <a:fld id="{F6728BC2-ACA3-447C-A909-F3F49211C066}" type="slidenum">
-              <a:rPr lang="en-US" smtClean="0"/>
-              <a:pPr/>
-              <a:t>7</a:t>
-            </a:fld>
-            <a:endParaRPr lang="en-US" dirty="0"/>
-          </a:p>
-        </p:txBody>
-      </p:sp>
-    </p:spTree>
-    <p:extLst>
-      <p:ext uri="{BB962C8B-B14F-4D97-AF65-F5344CB8AC3E}">
-        <p14:creationId xmlns:p14="http://schemas.microsoft.com/office/powerpoint/2010/main" val="2441782704"/>
-      </p:ext>
-    </p:extLst>
-  </p:cSld>
-  <p:clrMapOvr>
-    <a:masterClrMapping/>
-  </p:clrMapOvr>
-</p:sld>
-</file>
-
-<file path=ppt/slides/slide9.xml><?xml version="1.0" encoding="utf-8"?>
-<p:sld xmlns:a="http://schemas.openxmlformats.org/drawingml/2006/main" xmlns:r="http://schemas.openxmlformats.org/officeDocument/2006/relationships" xmlns:p="http://schemas.openxmlformats.org/presentationml/2006/main">
-  <p:cSld>
-    <p:spTree>
-      <p:nvGrpSpPr>
-        <p:cNvPr id="1" name=""/>
-        <p:cNvGrpSpPr/>
-        <p:nvPr/>
-      </p:nvGrpSpPr>
-      <p:grpSpPr>
-        <a:xfrm>
-          <a:off x="0" y="0"/>
-          <a:ext cx="0" cy="0"/>
-          <a:chOff x="0" y="0"/>
-          <a:chExt cx="0" cy="0"/>
-        </a:xfrm>
-      </p:grpSpPr>
-      <p:sp>
-        <p:nvSpPr>
-          <p:cNvPr id="2" name="Title 1">
-            <a:extLst>
-              <a:ext uri="{FF2B5EF4-FFF2-40B4-BE49-F238E27FC236}">
-                <a16:creationId xmlns:a16="http://schemas.microsoft.com/office/drawing/2014/main" id="{B49433A1-1DCC-46BD-AF19-1333963435A5}"/>
-              </a:ext>
-            </a:extLst>
-          </p:cNvPr>
-          <p:cNvSpPr>
-            <a:spLocks noGrp="1"/>
-          </p:cNvSpPr>
-          <p:nvPr>
-            <p:ph type="title"/>
-          </p:nvPr>
-        </p:nvSpPr>
-        <p:spPr/>
-        <p:txBody>
-          <a:bodyPr/>
-          <a:lstStyle/>
-          <a:p>
-            <a:r>
-              <a:rPr lang="en-US" dirty="0"/>
-              <a:t>Assignment Visual</a:t>
-            </a:r>
-          </a:p>
-        </p:txBody>
-      </p:sp>
-      <p:sp>
-        <p:nvSpPr>
-          <p:cNvPr id="4" name="Slide Number Placeholder 3">
-            <a:extLst>
-              <a:ext uri="{FF2B5EF4-FFF2-40B4-BE49-F238E27FC236}">
-                <a16:creationId xmlns:a16="http://schemas.microsoft.com/office/drawing/2014/main" id="{5257505C-523C-40CD-9517-61F02B8FF0ED}"/>
-              </a:ext>
-            </a:extLst>
-          </p:cNvPr>
-          <p:cNvSpPr>
-            <a:spLocks noGrp="1"/>
-          </p:cNvSpPr>
-          <p:nvPr>
-            <p:ph type="sldNum" sz="quarter" idx="12"/>
-          </p:nvPr>
-        </p:nvSpPr>
-        <p:spPr/>
-        <p:txBody>
-          <a:bodyPr/>
-          <a:lstStyle/>
-          <a:p>
-            <a:fld id="{F6728BC2-ACA3-447C-A909-F3F49211C066}" type="slidenum">
-              <a:rPr lang="en-US" smtClean="0"/>
-              <a:pPr/>
-              <a:t>8</a:t>
-            </a:fld>
-            <a:endParaRPr lang="en-US" dirty="0"/>
-          </a:p>
-        </p:txBody>
-      </p:sp>
-      <p:sp>
-        <p:nvSpPr>
-          <p:cNvPr id="5" name="Rectangle: Rounded Corners 4">
-            <a:extLst>
-              <a:ext uri="{FF2B5EF4-FFF2-40B4-BE49-F238E27FC236}">
-                <a16:creationId xmlns:a16="http://schemas.microsoft.com/office/drawing/2014/main" id="{C72B6229-1DAC-4330-A3C5-0D3754C11367}"/>
-              </a:ext>
-            </a:extLst>
-          </p:cNvPr>
-          <p:cNvSpPr/>
-          <p:nvPr/>
-        </p:nvSpPr>
-        <p:spPr>
-          <a:xfrm>
-            <a:off x="193810" y="1480931"/>
-            <a:ext cx="8790618" cy="1431234"/>
-          </a:xfrm>
-          <a:prstGeom prst="roundRect">
-            <a:avLst/>
-          </a:prstGeom>
-          <a:solidFill>
-            <a:schemeClr val="accent1">
-              <a:lumMod val="20000"/>
-              <a:lumOff val="80000"/>
-            </a:schemeClr>
-          </a:solidFill>
-        </p:spPr>
-        <p:style>
-          <a:lnRef idx="2">
-            <a:schemeClr val="accent1">
-              <a:shade val="50000"/>
-            </a:schemeClr>
-          </a:lnRef>
-          <a:fillRef idx="1">
-            <a:schemeClr val="accent1"/>
-          </a:fillRef>
-          <a:effectRef idx="0">
-            <a:schemeClr val="accent1"/>
-          </a:effectRef>
-          <a:fontRef idx="minor">
-            <a:schemeClr val="lt1"/>
-          </a:fontRef>
-        </p:style>
-        <p:txBody>
-          <a:bodyPr rtlCol="0" anchor="ctr"/>
-          <a:lstStyle/>
-          <a:p>
-            <a:pPr algn="ctr"/>
-            <a:endParaRPr lang="en-US"/>
-          </a:p>
-        </p:txBody>
-      </p:sp>
-      <p:sp>
-        <p:nvSpPr>
-          <p:cNvPr id="6" name="Rectangle: Rounded Corners 5">
-            <a:extLst>
-              <a:ext uri="{FF2B5EF4-FFF2-40B4-BE49-F238E27FC236}">
-                <a16:creationId xmlns:a16="http://schemas.microsoft.com/office/drawing/2014/main" id="{EA5A7E6C-551F-45EE-9FB4-61D87BDD1BCC}"/>
-              </a:ext>
-            </a:extLst>
-          </p:cNvPr>
-          <p:cNvSpPr/>
-          <p:nvPr/>
-        </p:nvSpPr>
-        <p:spPr>
-          <a:xfrm>
-            <a:off x="193812" y="3297984"/>
-            <a:ext cx="8790616" cy="1431235"/>
-          </a:xfrm>
-          <a:prstGeom prst="roundRect">
-            <a:avLst/>
-          </a:prstGeom>
-          <a:solidFill>
-            <a:schemeClr val="accent1">
-              <a:lumMod val="20000"/>
-              <a:lumOff val="80000"/>
-            </a:schemeClr>
-          </a:solidFill>
-        </p:spPr>
-        <p:style>
-          <a:lnRef idx="2">
-            <a:schemeClr val="accent1">
-              <a:shade val="50000"/>
-            </a:schemeClr>
-          </a:lnRef>
-          <a:fillRef idx="1">
-            <a:schemeClr val="accent1"/>
-          </a:fillRef>
-          <a:effectRef idx="0">
-            <a:schemeClr val="accent1"/>
-          </a:effectRef>
-          <a:fontRef idx="minor">
-            <a:schemeClr val="lt1"/>
-          </a:fontRef>
-        </p:style>
-        <p:txBody>
-          <a:bodyPr rtlCol="0" anchor="ctr"/>
-          <a:lstStyle/>
-          <a:p>
-            <a:pPr algn="ctr"/>
-            <a:endParaRPr lang="en-US"/>
-          </a:p>
-        </p:txBody>
-      </p:sp>
-      <p:sp>
-        <p:nvSpPr>
-          <p:cNvPr id="7" name="Rectangle: Rounded Corners 6">
-            <a:extLst>
-              <a:ext uri="{FF2B5EF4-FFF2-40B4-BE49-F238E27FC236}">
-                <a16:creationId xmlns:a16="http://schemas.microsoft.com/office/drawing/2014/main" id="{BAE607B7-2DAC-41D7-9E70-C0FCB604872D}"/>
-              </a:ext>
-            </a:extLst>
-          </p:cNvPr>
-          <p:cNvSpPr/>
-          <p:nvPr/>
-        </p:nvSpPr>
-        <p:spPr>
-          <a:xfrm>
-            <a:off x="191987" y="5115039"/>
-            <a:ext cx="8760026" cy="1431235"/>
-          </a:xfrm>
-          <a:prstGeom prst="roundRect">
-            <a:avLst/>
-          </a:prstGeom>
-          <a:solidFill>
-            <a:schemeClr val="accent1">
-              <a:lumMod val="20000"/>
-              <a:lumOff val="80000"/>
-            </a:schemeClr>
-          </a:solidFill>
-        </p:spPr>
-        <p:style>
-          <a:lnRef idx="2">
-            <a:schemeClr val="accent1">
-              <a:shade val="50000"/>
-            </a:schemeClr>
-          </a:lnRef>
-          <a:fillRef idx="1">
-            <a:schemeClr val="accent1"/>
-          </a:fillRef>
-          <a:effectRef idx="0">
-            <a:schemeClr val="accent1"/>
-          </a:effectRef>
-          <a:fontRef idx="minor">
-            <a:schemeClr val="lt1"/>
-          </a:fontRef>
-        </p:style>
-        <p:txBody>
-          <a:bodyPr rtlCol="0" anchor="ctr"/>
-          <a:lstStyle/>
-          <a:p>
-            <a:pPr algn="ctr"/>
-            <a:endParaRPr lang="en-US"/>
-          </a:p>
-        </p:txBody>
-      </p:sp>
-      <p:sp>
-        <p:nvSpPr>
-          <p:cNvPr id="14" name="Rectangle: Rounded Corners 13">
-            <a:extLst>
-              <a:ext uri="{FF2B5EF4-FFF2-40B4-BE49-F238E27FC236}">
-                <a16:creationId xmlns:a16="http://schemas.microsoft.com/office/drawing/2014/main" id="{1839A7D8-95BC-4F7B-BC98-5CA51010CDEB}"/>
-              </a:ext>
-            </a:extLst>
-          </p:cNvPr>
-          <p:cNvSpPr/>
-          <p:nvPr/>
-        </p:nvSpPr>
-        <p:spPr>
-          <a:xfrm>
-            <a:off x="207433" y="1491623"/>
-            <a:ext cx="4584700" cy="1409068"/>
-          </a:xfrm>
-          <a:prstGeom prst="roundRect">
-            <a:avLst/>
-          </a:prstGeom>
-          <a:solidFill>
-            <a:schemeClr val="accent1"/>
-          </a:solidFill>
-          <a:ln>
-            <a:noFill/>
-          </a:ln>
-        </p:spPr>
-        <p:style>
-          <a:lnRef idx="0">
-            <a:scrgbClr r="0" g="0" b="0"/>
-          </a:lnRef>
-          <a:fillRef idx="0">
-            <a:scrgbClr r="0" g="0" b="0"/>
-          </a:fillRef>
-          <a:effectRef idx="0">
-            <a:scrgbClr r="0" g="0" b="0"/>
-          </a:effectRef>
-          <a:fontRef idx="minor">
-            <a:schemeClr val="lt1"/>
-          </a:fontRef>
-        </p:style>
-        <p:txBody>
-          <a:bodyPr rtlCol="0" anchor="ctr"/>
-          <a:lstStyle/>
-          <a:p>
-            <a:pPr algn="ctr"/>
-            <a:endParaRPr lang="en-US"/>
-          </a:p>
-        </p:txBody>
-      </p:sp>
-      <p:sp>
-        <p:nvSpPr>
-          <p:cNvPr id="15" name="Rectangle 14">
-            <a:extLst>
-              <a:ext uri="{FF2B5EF4-FFF2-40B4-BE49-F238E27FC236}">
-                <a16:creationId xmlns:a16="http://schemas.microsoft.com/office/drawing/2014/main" id="{E18B4BFD-B7E7-44B0-868A-AADFE515101B}"/>
-              </a:ext>
-            </a:extLst>
-          </p:cNvPr>
-          <p:cNvSpPr/>
-          <p:nvPr/>
-        </p:nvSpPr>
-        <p:spPr>
-          <a:xfrm>
-            <a:off x="4583113" y="1488052"/>
-            <a:ext cx="525802" cy="1409068"/>
-          </a:xfrm>
-          <a:prstGeom prst="rect">
-            <a:avLst/>
-          </a:prstGeom>
-          <a:solidFill>
-            <a:schemeClr val="accent1">
-              <a:lumMod val="20000"/>
-              <a:lumOff val="80000"/>
-            </a:schemeClr>
-          </a:solidFill>
-          <a:ln>
-            <a:noFill/>
-          </a:ln>
-        </p:spPr>
-        <p:style>
-          <a:lnRef idx="0">
-            <a:scrgbClr r="0" g="0" b="0"/>
-          </a:lnRef>
-          <a:fillRef idx="0">
-            <a:scrgbClr r="0" g="0" b="0"/>
-          </a:fillRef>
-          <a:effectRef idx="0">
-            <a:scrgbClr r="0" g="0" b="0"/>
-          </a:effectRef>
-          <a:fontRef idx="minor">
-            <a:schemeClr val="lt1"/>
-          </a:fontRef>
-        </p:style>
-        <p:txBody>
-          <a:bodyPr rtlCol="0" anchor="ctr"/>
-          <a:lstStyle/>
-          <a:p>
-            <a:pPr algn="ctr"/>
-            <a:endParaRPr lang="en-US"/>
-          </a:p>
-        </p:txBody>
-      </p:sp>
-      <p:sp>
-        <p:nvSpPr>
-          <p:cNvPr id="18" name="Rectangle: Rounded Corners 17">
-            <a:extLst>
-              <a:ext uri="{FF2B5EF4-FFF2-40B4-BE49-F238E27FC236}">
-                <a16:creationId xmlns:a16="http://schemas.microsoft.com/office/drawing/2014/main" id="{6D9ED600-A942-4755-BB6A-6CA0CC107A18}"/>
-              </a:ext>
-            </a:extLst>
-          </p:cNvPr>
-          <p:cNvSpPr/>
-          <p:nvPr/>
-        </p:nvSpPr>
-        <p:spPr>
-          <a:xfrm>
-            <a:off x="207433" y="3309458"/>
-            <a:ext cx="4584700" cy="1409068"/>
-          </a:xfrm>
-          <a:prstGeom prst="roundRect">
-            <a:avLst/>
-          </a:prstGeom>
-          <a:solidFill>
-            <a:schemeClr val="accent1"/>
-          </a:solidFill>
-          <a:ln>
-            <a:noFill/>
-          </a:ln>
-        </p:spPr>
-        <p:style>
-          <a:lnRef idx="0">
-            <a:scrgbClr r="0" g="0" b="0"/>
-          </a:lnRef>
-          <a:fillRef idx="0">
-            <a:scrgbClr r="0" g="0" b="0"/>
-          </a:fillRef>
-          <a:effectRef idx="0">
-            <a:scrgbClr r="0" g="0" b="0"/>
-          </a:effectRef>
-          <a:fontRef idx="minor">
-            <a:schemeClr val="lt1"/>
-          </a:fontRef>
-        </p:style>
-        <p:txBody>
-          <a:bodyPr rtlCol="0" anchor="ctr"/>
-          <a:lstStyle/>
-          <a:p>
-            <a:pPr algn="ctr"/>
-            <a:endParaRPr lang="en-US"/>
-          </a:p>
-        </p:txBody>
-      </p:sp>
-      <p:sp>
-        <p:nvSpPr>
-          <p:cNvPr id="19" name="Rectangle 18">
-            <a:extLst>
-              <a:ext uri="{FF2B5EF4-FFF2-40B4-BE49-F238E27FC236}">
-                <a16:creationId xmlns:a16="http://schemas.microsoft.com/office/drawing/2014/main" id="{28F43B71-28B9-4E0D-AA55-34F036682DC5}"/>
-              </a:ext>
-            </a:extLst>
-          </p:cNvPr>
-          <p:cNvSpPr/>
-          <p:nvPr/>
-        </p:nvSpPr>
-        <p:spPr>
-          <a:xfrm>
-            <a:off x="4624861" y="3297984"/>
-            <a:ext cx="484054" cy="1409068"/>
-          </a:xfrm>
-          <a:prstGeom prst="rect">
-            <a:avLst/>
-          </a:prstGeom>
-          <a:solidFill>
-            <a:schemeClr val="accent1">
-              <a:lumMod val="20000"/>
-              <a:lumOff val="80000"/>
-            </a:schemeClr>
-          </a:solidFill>
-          <a:ln>
-            <a:noFill/>
-          </a:ln>
-        </p:spPr>
-        <p:style>
-          <a:lnRef idx="0">
-            <a:scrgbClr r="0" g="0" b="0"/>
-          </a:lnRef>
-          <a:fillRef idx="0">
-            <a:scrgbClr r="0" g="0" b="0"/>
-          </a:fillRef>
-          <a:effectRef idx="0">
-            <a:scrgbClr r="0" g="0" b="0"/>
-          </a:effectRef>
-          <a:fontRef idx="minor">
-            <a:schemeClr val="lt1"/>
-          </a:fontRef>
-        </p:style>
-        <p:txBody>
-          <a:bodyPr rtlCol="0" anchor="ctr"/>
-          <a:lstStyle/>
-          <a:p>
-            <a:pPr algn="ctr"/>
-            <a:endParaRPr lang="en-US"/>
-          </a:p>
-        </p:txBody>
-      </p:sp>
-      <p:sp>
-        <p:nvSpPr>
-          <p:cNvPr id="11" name="TextBox 10">
-            <a:extLst>
-              <a:ext uri="{FF2B5EF4-FFF2-40B4-BE49-F238E27FC236}">
-                <a16:creationId xmlns:a16="http://schemas.microsoft.com/office/drawing/2014/main" id="{B2B44A43-3459-4E33-AEEB-DD752BF8989B}"/>
-              </a:ext>
-            </a:extLst>
-          </p:cNvPr>
-          <p:cNvSpPr txBox="1"/>
-          <p:nvPr/>
-        </p:nvSpPr>
-        <p:spPr>
-          <a:xfrm>
-            <a:off x="394216" y="1779795"/>
-            <a:ext cx="3446777" cy="769441"/>
-          </a:xfrm>
-          <a:prstGeom prst="rect">
-            <a:avLst/>
-          </a:prstGeom>
-          <a:noFill/>
-        </p:spPr>
-        <p:txBody>
-          <a:bodyPr wrap="square" rtlCol="0">
-            <a:spAutoFit/>
-          </a:bodyPr>
-          <a:lstStyle/>
-          <a:p>
-            <a:r>
-              <a:rPr lang="en-US" sz="4400" b="1" dirty="0"/>
-              <a:t>Initialization</a:t>
-            </a:r>
-          </a:p>
-        </p:txBody>
-      </p:sp>
-      <p:sp>
-        <p:nvSpPr>
-          <p:cNvPr id="21" name="Rectangle: Rounded Corners 20">
-            <a:extLst>
-              <a:ext uri="{FF2B5EF4-FFF2-40B4-BE49-F238E27FC236}">
-                <a16:creationId xmlns:a16="http://schemas.microsoft.com/office/drawing/2014/main" id="{006FA9B6-7DB1-48C6-90C9-DFFC3BC81BD6}"/>
-              </a:ext>
-            </a:extLst>
-          </p:cNvPr>
-          <p:cNvSpPr/>
-          <p:nvPr/>
-        </p:nvSpPr>
-        <p:spPr>
-          <a:xfrm>
-            <a:off x="207433" y="5133654"/>
-            <a:ext cx="4584700" cy="1409068"/>
-          </a:xfrm>
-          <a:prstGeom prst="roundRect">
-            <a:avLst/>
-          </a:prstGeom>
-          <a:solidFill>
-            <a:schemeClr val="accent1"/>
-          </a:solidFill>
-          <a:ln>
-            <a:noFill/>
-          </a:ln>
-        </p:spPr>
-        <p:style>
-          <a:lnRef idx="0">
-            <a:scrgbClr r="0" g="0" b="0"/>
-          </a:lnRef>
-          <a:fillRef idx="0">
-            <a:scrgbClr r="0" g="0" b="0"/>
-          </a:fillRef>
-          <a:effectRef idx="0">
-            <a:scrgbClr r="0" g="0" b="0"/>
-          </a:effectRef>
-          <a:fontRef idx="minor">
-            <a:schemeClr val="lt1"/>
-          </a:fontRef>
-        </p:style>
-        <p:txBody>
-          <a:bodyPr rtlCol="0" anchor="ctr"/>
-          <a:lstStyle/>
-          <a:p>
-            <a:pPr algn="ctr"/>
-            <a:endParaRPr lang="en-US"/>
-          </a:p>
-        </p:txBody>
-      </p:sp>
-      <p:sp>
-        <p:nvSpPr>
-          <p:cNvPr id="22" name="Rectangle 21">
-            <a:extLst>
-              <a:ext uri="{FF2B5EF4-FFF2-40B4-BE49-F238E27FC236}">
-                <a16:creationId xmlns:a16="http://schemas.microsoft.com/office/drawing/2014/main" id="{435585D2-A176-4286-9333-02832B6034CF}"/>
-              </a:ext>
-            </a:extLst>
-          </p:cNvPr>
-          <p:cNvSpPr/>
-          <p:nvPr/>
-        </p:nvSpPr>
-        <p:spPr>
-          <a:xfrm>
-            <a:off x="4624861" y="5122180"/>
-            <a:ext cx="484054" cy="1409068"/>
-          </a:xfrm>
-          <a:prstGeom prst="rect">
-            <a:avLst/>
-          </a:prstGeom>
-          <a:solidFill>
-            <a:schemeClr val="accent1">
-              <a:lumMod val="20000"/>
-              <a:lumOff val="80000"/>
-            </a:schemeClr>
-          </a:solidFill>
-          <a:ln>
-            <a:noFill/>
-          </a:ln>
-        </p:spPr>
-        <p:style>
-          <a:lnRef idx="0">
-            <a:scrgbClr r="0" g="0" b="0"/>
-          </a:lnRef>
-          <a:fillRef idx="0">
-            <a:scrgbClr r="0" g="0" b="0"/>
-          </a:fillRef>
-          <a:effectRef idx="0">
-            <a:scrgbClr r="0" g="0" b="0"/>
-          </a:effectRef>
-          <a:fontRef idx="minor">
-            <a:schemeClr val="lt1"/>
-          </a:fontRef>
-        </p:style>
-        <p:txBody>
-          <a:bodyPr rtlCol="0" anchor="ctr"/>
-          <a:lstStyle/>
-          <a:p>
-            <a:pPr algn="ctr"/>
-            <a:endParaRPr lang="en-US" dirty="0"/>
-          </a:p>
-        </p:txBody>
-      </p:sp>
-      <p:sp>
-        <p:nvSpPr>
-          <p:cNvPr id="12" name="TextBox 11">
-            <a:extLst>
-              <a:ext uri="{FF2B5EF4-FFF2-40B4-BE49-F238E27FC236}">
-                <a16:creationId xmlns:a16="http://schemas.microsoft.com/office/drawing/2014/main" id="{3FC44194-FA53-44CF-A4C2-5B4453309CBA}"/>
-              </a:ext>
-            </a:extLst>
-          </p:cNvPr>
-          <p:cNvSpPr txBox="1"/>
-          <p:nvPr/>
-        </p:nvSpPr>
-        <p:spPr>
-          <a:xfrm>
-            <a:off x="394216" y="3570407"/>
-            <a:ext cx="3414717" cy="769441"/>
-          </a:xfrm>
-          <a:prstGeom prst="rect">
-            <a:avLst/>
-          </a:prstGeom>
-          <a:noFill/>
-        </p:spPr>
-        <p:txBody>
-          <a:bodyPr wrap="none" rtlCol="0">
-            <a:spAutoFit/>
-          </a:bodyPr>
-          <a:lstStyle/>
-          <a:p>
-            <a:r>
-              <a:rPr lang="en-US" sz="4400" b="1" dirty="0"/>
-              <a:t>Assignment</a:t>
-            </a:r>
-          </a:p>
-        </p:txBody>
-      </p:sp>
-      <p:sp>
-        <p:nvSpPr>
-          <p:cNvPr id="13" name="TextBox 12">
-            <a:extLst>
-              <a:ext uri="{FF2B5EF4-FFF2-40B4-BE49-F238E27FC236}">
-                <a16:creationId xmlns:a16="http://schemas.microsoft.com/office/drawing/2014/main" id="{4E2CC632-EABA-4167-98B5-2DAE929B7D03}"/>
-              </a:ext>
-            </a:extLst>
-          </p:cNvPr>
-          <p:cNvSpPr txBox="1"/>
-          <p:nvPr/>
-        </p:nvSpPr>
-        <p:spPr>
-          <a:xfrm>
-            <a:off x="394216" y="5379540"/>
-            <a:ext cx="4230645" cy="769441"/>
-          </a:xfrm>
-          <a:prstGeom prst="rect">
-            <a:avLst/>
-          </a:prstGeom>
-          <a:noFill/>
-        </p:spPr>
-        <p:txBody>
-          <a:bodyPr wrap="none" rtlCol="0">
-            <a:spAutoFit/>
-          </a:bodyPr>
-          <a:lstStyle/>
-          <a:p>
-            <a:r>
-              <a:rPr lang="en-US" sz="4400" b="1" dirty="0"/>
-              <a:t>Re-assignment</a:t>
-            </a:r>
-          </a:p>
-        </p:txBody>
-      </p:sp>
-      <p:sp>
-        <p:nvSpPr>
-          <p:cNvPr id="8" name="TextBox 7">
-            <a:extLst>
-              <a:ext uri="{FF2B5EF4-FFF2-40B4-BE49-F238E27FC236}">
-                <a16:creationId xmlns:a16="http://schemas.microsoft.com/office/drawing/2014/main" id="{58FC0DCE-1973-4AA7-8F42-40C464C8E998}"/>
-              </a:ext>
-            </a:extLst>
-          </p:cNvPr>
-          <p:cNvSpPr txBox="1"/>
-          <p:nvPr/>
-        </p:nvSpPr>
-        <p:spPr>
-          <a:xfrm>
-            <a:off x="4751469" y="1828624"/>
-            <a:ext cx="1633781" cy="523220"/>
-          </a:xfrm>
-          <a:prstGeom prst="rect">
-            <a:avLst/>
-          </a:prstGeom>
-          <a:noFill/>
-        </p:spPr>
-        <p:txBody>
-          <a:bodyPr wrap="none" rtlCol="0">
-            <a:spAutoFit/>
-          </a:bodyPr>
-          <a:lstStyle/>
-          <a:p>
-            <a:r>
-              <a:rPr lang="en-US" sz="2800" b="1" dirty="0"/>
-              <a:t>let y = 5;</a:t>
-            </a:r>
-          </a:p>
-        </p:txBody>
-      </p:sp>
-      <p:sp>
-        <p:nvSpPr>
-          <p:cNvPr id="9" name="TextBox 8">
-            <a:extLst>
-              <a:ext uri="{FF2B5EF4-FFF2-40B4-BE49-F238E27FC236}">
-                <a16:creationId xmlns:a16="http://schemas.microsoft.com/office/drawing/2014/main" id="{968D59A1-689F-4596-AA03-6905B5D5F31C}"/>
-              </a:ext>
-            </a:extLst>
-          </p:cNvPr>
-          <p:cNvSpPr txBox="1"/>
-          <p:nvPr/>
-        </p:nvSpPr>
-        <p:spPr>
-          <a:xfrm>
-            <a:off x="4788242" y="3509283"/>
-            <a:ext cx="4209807" cy="954107"/>
-          </a:xfrm>
-          <a:prstGeom prst="rect">
-            <a:avLst/>
-          </a:prstGeom>
-          <a:noFill/>
-        </p:spPr>
-        <p:txBody>
-          <a:bodyPr wrap="none" rtlCol="0">
-            <a:spAutoFit/>
-          </a:bodyPr>
-          <a:lstStyle/>
-          <a:p>
-            <a:r>
-              <a:rPr lang="en-US" sz="2800" b="1" dirty="0"/>
-              <a:t>let </a:t>
-            </a:r>
-            <a:r>
-              <a:rPr lang="en-US" sz="2800" b="1" dirty="0" err="1"/>
-              <a:t>myName</a:t>
-            </a:r>
-            <a:r>
-              <a:rPr lang="en-US" sz="2800" b="1" dirty="0"/>
-              <a:t>;</a:t>
-            </a:r>
-          </a:p>
-          <a:p>
-            <a:r>
-              <a:rPr lang="en-US" sz="2800" b="1" dirty="0" err="1"/>
-              <a:t>myName</a:t>
-            </a:r>
-            <a:r>
-              <a:rPr lang="en-US" sz="2800" b="1" dirty="0"/>
-              <a:t> = “John Doe”;</a:t>
-            </a:r>
-          </a:p>
-        </p:txBody>
-      </p:sp>
-      <p:sp>
-        <p:nvSpPr>
-          <p:cNvPr id="10" name="TextBox 9">
-            <a:extLst>
-              <a:ext uri="{FF2B5EF4-FFF2-40B4-BE49-F238E27FC236}">
-                <a16:creationId xmlns:a16="http://schemas.microsoft.com/office/drawing/2014/main" id="{219770C9-6574-43D3-95DD-A2A10A98B2E2}"/>
-              </a:ext>
-            </a:extLst>
-          </p:cNvPr>
-          <p:cNvSpPr txBox="1"/>
-          <p:nvPr/>
-        </p:nvSpPr>
-        <p:spPr>
-          <a:xfrm>
-            <a:off x="4788242" y="5242715"/>
-            <a:ext cx="2775119" cy="954107"/>
-          </a:xfrm>
-          <a:prstGeom prst="rect">
-            <a:avLst/>
-          </a:prstGeom>
-          <a:noFill/>
-        </p:spPr>
-        <p:txBody>
-          <a:bodyPr wrap="none" rtlCol="0">
-            <a:spAutoFit/>
-          </a:bodyPr>
-          <a:lstStyle/>
-          <a:p>
-            <a:r>
-              <a:rPr lang="en-US" sz="2800" b="1" dirty="0"/>
-              <a:t>let year = 2021;</a:t>
-            </a:r>
-          </a:p>
-          <a:p>
-            <a:r>
-              <a:rPr lang="en-US" sz="2800" b="1" dirty="0"/>
-              <a:t>year = 2022;</a:t>
-            </a:r>
-          </a:p>
-        </p:txBody>
-      </p:sp>
-      <p:sp>
-        <p:nvSpPr>
-          <p:cNvPr id="3" name="Rectangle: Rounded Corners 2">
-            <a:extLst>
-              <a:ext uri="{FF2B5EF4-FFF2-40B4-BE49-F238E27FC236}">
-                <a16:creationId xmlns:a16="http://schemas.microsoft.com/office/drawing/2014/main" id="{E13D2088-2E77-4188-B495-474162D0E119}"/>
-              </a:ext>
-            </a:extLst>
-          </p:cNvPr>
-          <p:cNvSpPr/>
-          <p:nvPr/>
-        </p:nvSpPr>
-        <p:spPr>
-          <a:xfrm>
-            <a:off x="207433" y="1480931"/>
-            <a:ext cx="8790616" cy="1409068"/>
-          </a:xfrm>
-          <a:prstGeom prst="roundRect">
-            <a:avLst/>
-          </a:prstGeom>
-          <a:noFill/>
-          <a:ln w="38100"/>
-        </p:spPr>
-        <p:style>
-          <a:lnRef idx="2">
-            <a:schemeClr val="accent1">
-              <a:shade val="50000"/>
-            </a:schemeClr>
-          </a:lnRef>
-          <a:fillRef idx="1">
-            <a:schemeClr val="accent1"/>
-          </a:fillRef>
-          <a:effectRef idx="0">
-            <a:schemeClr val="accent1"/>
-          </a:effectRef>
-          <a:fontRef idx="minor">
-            <a:schemeClr val="lt1"/>
-          </a:fontRef>
-        </p:style>
-        <p:txBody>
-          <a:bodyPr rtlCol="0" anchor="ctr"/>
-          <a:lstStyle/>
-          <a:p>
-            <a:pPr algn="ctr"/>
-            <a:endParaRPr lang="en-US"/>
-          </a:p>
-        </p:txBody>
-      </p:sp>
-      <p:sp>
-        <p:nvSpPr>
-          <p:cNvPr id="23" name="Rectangle: Rounded Corners 22">
-            <a:extLst>
-              <a:ext uri="{FF2B5EF4-FFF2-40B4-BE49-F238E27FC236}">
-                <a16:creationId xmlns:a16="http://schemas.microsoft.com/office/drawing/2014/main" id="{D1C11925-33BB-4B9E-8B30-A8237CB156C2}"/>
-              </a:ext>
-            </a:extLst>
-          </p:cNvPr>
-          <p:cNvSpPr/>
-          <p:nvPr/>
-        </p:nvSpPr>
-        <p:spPr>
-          <a:xfrm>
-            <a:off x="187804" y="3303722"/>
-            <a:ext cx="8790618" cy="1431234"/>
-          </a:xfrm>
-          <a:prstGeom prst="roundRect">
-            <a:avLst/>
-          </a:prstGeom>
-          <a:noFill/>
-          <a:ln w="38100"/>
-        </p:spPr>
-        <p:style>
-          <a:lnRef idx="2">
-            <a:schemeClr val="accent1">
-              <a:shade val="50000"/>
-            </a:schemeClr>
-          </a:lnRef>
-          <a:fillRef idx="1">
-            <a:schemeClr val="accent1"/>
-          </a:fillRef>
-          <a:effectRef idx="0">
-            <a:schemeClr val="accent1"/>
-          </a:effectRef>
-          <a:fontRef idx="minor">
-            <a:schemeClr val="lt1"/>
-          </a:fontRef>
-        </p:style>
-        <p:txBody>
-          <a:bodyPr rtlCol="0" anchor="ctr"/>
-          <a:lstStyle/>
-          <a:p>
-            <a:pPr algn="ctr"/>
-            <a:endParaRPr lang="en-US"/>
-          </a:p>
-        </p:txBody>
-      </p:sp>
-      <p:sp>
-        <p:nvSpPr>
-          <p:cNvPr id="24" name="Rectangle: Rounded Corners 23">
-            <a:extLst>
-              <a:ext uri="{FF2B5EF4-FFF2-40B4-BE49-F238E27FC236}">
-                <a16:creationId xmlns:a16="http://schemas.microsoft.com/office/drawing/2014/main" id="{A2B18FDA-070E-47C9-AFDF-614C255A85C0}"/>
-              </a:ext>
-            </a:extLst>
-          </p:cNvPr>
-          <p:cNvSpPr/>
-          <p:nvPr/>
-        </p:nvSpPr>
-        <p:spPr>
-          <a:xfrm>
-            <a:off x="176691" y="5133654"/>
-            <a:ext cx="8790618" cy="1431234"/>
-          </a:xfrm>
-          <a:prstGeom prst="roundRect">
-            <a:avLst/>
-          </a:prstGeom>
-          <a:noFill/>
-          <a:ln w="38100"/>
-        </p:spPr>
-        <p:style>
-          <a:lnRef idx="2">
-            <a:schemeClr val="accent1">
-              <a:shade val="50000"/>
-            </a:schemeClr>
-          </a:lnRef>
-          <a:fillRef idx="1">
-            <a:schemeClr val="accent1"/>
-          </a:fillRef>
-          <a:effectRef idx="0">
-            <a:schemeClr val="accent1"/>
-          </a:effectRef>
-          <a:fontRef idx="minor">
-            <a:schemeClr val="lt1"/>
-          </a:fontRef>
-        </p:style>
-        <p:txBody>
-          <a:bodyPr rtlCol="0" anchor="ctr"/>
-          <a:lstStyle/>
-          <a:p>
-            <a:pPr algn="ctr"/>
-            <a:endParaRPr lang="en-US"/>
-          </a:p>
-        </p:txBody>
-      </p:sp>
-    </p:spTree>
-    <p:extLst>
-      <p:ext uri="{BB962C8B-B14F-4D97-AF65-F5344CB8AC3E}">
-        <p14:creationId xmlns:p14="http://schemas.microsoft.com/office/powerpoint/2010/main" val="455569934"/>
       </p:ext>
     </p:extLst>
   </p:cSld>
@@ -46477,6 +46483,23 @@
 </file>
 
 <file path=customXml/item1.xml><?xml version="1.0" encoding="utf-8"?>
+<p:properties xmlns:p="http://schemas.microsoft.com/office/2006/metadata/properties" xmlns:xsi="http://www.w3.org/2001/XMLSchema-instance" xmlns:pc="http://schemas.microsoft.com/office/infopath/2007/PartnerControls">
+  <documentManagement>
+    <Details xmlns="16399201-8c70-4094-bedf-0e0052933be2" xsi:nil="true"/>
+  </documentManagement>
+</p:properties>
+</file>
+
+<file path=customXml/item2.xml><?xml version="1.0" encoding="utf-8"?>
+<?mso-contentType ?>
+<FormTemplates xmlns="http://schemas.microsoft.com/sharepoint/v3/contenttype/forms">
+  <Display>DocumentLibraryForm</Display>
+  <Edit>DocumentLibraryForm</Edit>
+  <New>DocumentLibraryForm</New>
+</FormTemplates>
+</file>
+
+<file path=customXml/item3.xml><?xml version="1.0" encoding="utf-8"?>
 <ct:contentTypeSchema xmlns:ct="http://schemas.microsoft.com/office/2006/metadata/contentType" xmlns:ma="http://schemas.microsoft.com/office/2006/metadata/properties/metaAttributes" ct:_="" ma:_="" ma:contentTypeName="Document" ma:contentTypeID="0x0101008BD2F010722D7D4D902378845F41F1B2" ma:contentTypeVersion="13" ma:contentTypeDescription="Create a new document." ma:contentTypeScope="" ma:versionID="b68d56871977609000cd171c9412956f">
   <xsd:schema xmlns:xsd="http://www.w3.org/2001/XMLSchema" xmlns:xs="http://www.w3.org/2001/XMLSchema" xmlns:p="http://schemas.microsoft.com/office/2006/metadata/properties" xmlns:ns2="16399201-8c70-4094-bedf-0e0052933be2" xmlns:ns3="c1d1d668-1a17-41cc-8e51-02c957e8f86c" targetNamespace="http://schemas.microsoft.com/office/2006/metadata/properties" ma:root="true" ma:fieldsID="8d4e77ac156dfa649f0a05adbe1f888e" ns2:_="" ns3:_="">
     <xsd:import namespace="16399201-8c70-4094-bedf-0e0052933be2"/>
@@ -46701,31 +46724,39 @@
 </ct:contentTypeSchema>
 </file>
 
-<file path=customXml/item2.xml><?xml version="1.0" encoding="utf-8"?>
-<?mso-contentType ?>
-<FormTemplates xmlns="http://schemas.microsoft.com/sharepoint/v3/contenttype/forms">
-  <Display>DocumentLibraryForm</Display>
-  <Edit>DocumentLibraryForm</Edit>
-  <New>DocumentLibraryForm</New>
-</FormTemplates>
-</file>
-
-<file path=customXml/item3.xml><?xml version="1.0" encoding="utf-8"?>
-<p:properties xmlns:p="http://schemas.microsoft.com/office/2006/metadata/properties" xmlns:xsi="http://www.w3.org/2001/XMLSchema-instance" xmlns:pc="http://schemas.microsoft.com/office/infopath/2007/PartnerControls">
-  <documentManagement>
-    <Details xmlns="16399201-8c70-4094-bedf-0e0052933be2" xsi:nil="true"/>
-  </documentManagement>
-</p:properties>
-</file>
-
 <file path=customXml/itemProps1.xml><?xml version="1.0" encoding="utf-8"?>
-<ds:datastoreItem xmlns:ds="http://schemas.openxmlformats.org/officeDocument/2006/customXml" ds:itemID="{97612C41-C791-42CC-B84C-170DF7129C61}"/>
+<ds:datastoreItem xmlns:ds="http://schemas.openxmlformats.org/officeDocument/2006/customXml" ds:itemID="{9830D060-F2B4-42F1-8B05-8C637878939A}">
+  <ds:schemaRefs>
+    <ds:schemaRef ds:uri="http://schemas.microsoft.com/office/2006/metadata/properties"/>
+    <ds:schemaRef ds:uri="http://schemas.microsoft.com/office/infopath/2007/PartnerControls"/>
+    <ds:schemaRef ds:uri="16399201-8c70-4094-bedf-0e0052933be2"/>
+  </ds:schemaRefs>
+</ds:datastoreItem>
 </file>
 
 <file path=customXml/itemProps2.xml><?xml version="1.0" encoding="utf-8"?>
-<ds:datastoreItem xmlns:ds="http://schemas.openxmlformats.org/officeDocument/2006/customXml" ds:itemID="{3DDD91B0-48BF-4F14-9E6A-2A727F44FD34}"/>
+<ds:datastoreItem xmlns:ds="http://schemas.openxmlformats.org/officeDocument/2006/customXml" ds:itemID="{3DDD91B0-48BF-4F14-9E6A-2A727F44FD34}">
+  <ds:schemaRefs>
+    <ds:schemaRef ds:uri="http://schemas.microsoft.com/sharepoint/v3/contenttype/forms"/>
+  </ds:schemaRefs>
+</ds:datastoreItem>
 </file>
 
 <file path=customXml/itemProps3.xml><?xml version="1.0" encoding="utf-8"?>
-<ds:datastoreItem xmlns:ds="http://schemas.openxmlformats.org/officeDocument/2006/customXml" ds:itemID="{9830D060-F2B4-42F1-8B05-8C637878939A}"/>
+<ds:datastoreItem xmlns:ds="http://schemas.openxmlformats.org/officeDocument/2006/customXml" ds:itemID="{97612C41-C791-42CC-B84C-170DF7129C61}">
+  <ds:schemaRefs>
+    <ds:schemaRef ds:uri="http://schemas.microsoft.com/office/2006/metadata/contentType"/>
+    <ds:schemaRef ds:uri="http://schemas.microsoft.com/office/2006/metadata/properties/metaAttributes"/>
+    <ds:schemaRef ds:uri="http://www.w3.org/2001/XMLSchema"/>
+    <ds:schemaRef ds:uri="http://schemas.microsoft.com/office/2006/metadata/properties"/>
+    <ds:schemaRef ds:uri="16399201-8c70-4094-bedf-0e0052933be2"/>
+    <ds:schemaRef ds:uri="c1d1d668-1a17-41cc-8e51-02c957e8f86c"/>
+    <ds:schemaRef ds:uri="http://schemas.microsoft.com/office/2006/documentManagement/types"/>
+    <ds:schemaRef ds:uri="http://schemas.microsoft.com/office/infopath/2007/PartnerControls"/>
+    <ds:schemaRef ds:uri="http://schemas.openxmlformats.org/package/2006/metadata/core-properties"/>
+    <ds:schemaRef ds:uri="http://purl.org/dc/elements/1.1/"/>
+    <ds:schemaRef ds:uri="http://purl.org/dc/terms/"/>
+    <ds:schemaRef ds:uri="http://schemas.microsoft.com/internal/obd"/>
+  </ds:schemaRefs>
+</ds:datastoreItem>
 </file>
</xml_diff>